<commit_message>
added model2 rev3 includes tensor graphs + report rev2 + ppt
</commit_message>
<xml_diff>
--- a/Assignment_3/lstm_arc.pptx
+++ b/Assignment_3/lstm_arc.pptx
@@ -9,6 +9,7 @@
     <p:sldId id="257" r:id="rId3"/>
     <p:sldId id="258" r:id="rId4"/>
     <p:sldId id="259" r:id="rId5"/>
+    <p:sldId id="260" r:id="rId6"/>
   </p:sldIdLst>
   <p:sldSz cx="12192000" cy="6858000"/>
   <p:notesSz cx="6858000" cy="9144000"/>
@@ -157,10 +158,9 @@
           </a:lstStyle>
           <a:p>
             <a:r>
-              <a:rPr lang="en-US" smtClean="0"/>
+              <a:rPr lang="en-US"/>
               <a:t>Click to edit Master title style</a:t>
             </a:r>
-            <a:endParaRPr lang="en-US"/>
           </a:p>
         </p:txBody>
       </p:sp>
@@ -187,45 +187,44 @@
               <a:buNone/>
               <a:defRPr sz="2400"/>
             </a:lvl1pPr>
-            <a:lvl2pPr marL="457200" indent="0" algn="ctr">
+            <a:lvl2pPr marL="457206" indent="0" algn="ctr">
               <a:buNone/>
               <a:defRPr sz="2000"/>
             </a:lvl2pPr>
-            <a:lvl3pPr marL="914400" indent="0" algn="ctr">
+            <a:lvl3pPr marL="914411" indent="0" algn="ctr">
               <a:buNone/>
               <a:defRPr sz="1800"/>
             </a:lvl3pPr>
-            <a:lvl4pPr marL="1371600" indent="0" algn="ctr">
+            <a:lvl4pPr marL="1371617" indent="0" algn="ctr">
               <a:buNone/>
               <a:defRPr sz="1600"/>
             </a:lvl4pPr>
-            <a:lvl5pPr marL="1828800" indent="0" algn="ctr">
+            <a:lvl5pPr marL="1828823" indent="0" algn="ctr">
               <a:buNone/>
               <a:defRPr sz="1600"/>
             </a:lvl5pPr>
-            <a:lvl6pPr marL="2286000" indent="0" algn="ctr">
+            <a:lvl6pPr marL="2286029" indent="0" algn="ctr">
               <a:buNone/>
               <a:defRPr sz="1600"/>
             </a:lvl6pPr>
-            <a:lvl7pPr marL="2743200" indent="0" algn="ctr">
+            <a:lvl7pPr marL="2743234" indent="0" algn="ctr">
               <a:buNone/>
               <a:defRPr sz="1600"/>
             </a:lvl7pPr>
-            <a:lvl8pPr marL="3200400" indent="0" algn="ctr">
+            <a:lvl8pPr marL="3200440" indent="0" algn="ctr">
               <a:buNone/>
               <a:defRPr sz="1600"/>
             </a:lvl8pPr>
-            <a:lvl9pPr marL="3657600" indent="0" algn="ctr">
+            <a:lvl9pPr marL="3657646" indent="0" algn="ctr">
               <a:buNone/>
               <a:defRPr sz="1600"/>
             </a:lvl9pPr>
           </a:lstStyle>
           <a:p>
             <a:r>
-              <a:rPr lang="en-US" smtClean="0"/>
+              <a:rPr lang="en-US"/>
               <a:t>Click to edit Master subtitle style</a:t>
             </a:r>
-            <a:endParaRPr lang="en-US"/>
           </a:p>
         </p:txBody>
       </p:sp>
@@ -246,7 +245,7 @@
           <a:p>
             <a:fld id="{27D73BDF-F17D-4684-ADBA-0C9D48FC2E7D}" type="datetimeFigureOut">
               <a:rPr lang="en-US" smtClean="0"/>
-              <a:t>5/15/2021</a:t>
+              <a:t>5/16/2021</a:t>
             </a:fld>
             <a:endParaRPr lang="en-US"/>
           </a:p>
@@ -340,10 +339,9 @@
           <a:lstStyle/>
           <a:p>
             <a:r>
-              <a:rPr lang="en-US" smtClean="0"/>
+              <a:rPr lang="en-US"/>
               <a:t>Click to edit Master title style</a:t>
             </a:r>
-            <a:endParaRPr lang="en-US"/>
           </a:p>
         </p:txBody>
       </p:sp>
@@ -364,38 +362,37 @@
           <a:p>
             <a:pPr lvl="0"/>
             <a:r>
-              <a:rPr lang="en-US" smtClean="0"/>
+              <a:rPr lang="en-US"/>
               <a:t>Edit Master text styles</a:t>
             </a:r>
           </a:p>
           <a:p>
             <a:pPr lvl="1"/>
             <a:r>
-              <a:rPr lang="en-US" smtClean="0"/>
+              <a:rPr lang="en-US"/>
               <a:t>Second level</a:t>
             </a:r>
           </a:p>
           <a:p>
             <a:pPr lvl="2"/>
             <a:r>
-              <a:rPr lang="en-US" smtClean="0"/>
+              <a:rPr lang="en-US"/>
               <a:t>Third level</a:t>
             </a:r>
           </a:p>
           <a:p>
             <a:pPr lvl="3"/>
             <a:r>
-              <a:rPr lang="en-US" smtClean="0"/>
+              <a:rPr lang="en-US"/>
               <a:t>Fourth level</a:t>
             </a:r>
           </a:p>
           <a:p>
             <a:pPr lvl="4"/>
             <a:r>
-              <a:rPr lang="en-US" smtClean="0"/>
+              <a:rPr lang="en-US"/>
               <a:t>Fifth level</a:t>
             </a:r>
-            <a:endParaRPr lang="en-US"/>
           </a:p>
         </p:txBody>
       </p:sp>
@@ -416,7 +413,7 @@
           <a:p>
             <a:fld id="{27D73BDF-F17D-4684-ADBA-0C9D48FC2E7D}" type="datetimeFigureOut">
               <a:rPr lang="en-US" smtClean="0"/>
-              <a:t>5/15/2021</a:t>
+              <a:t>5/16/2021</a:t>
             </a:fld>
             <a:endParaRPr lang="en-US"/>
           </a:p>
@@ -506,7 +503,7 @@
         </p:nvSpPr>
         <p:spPr>
           <a:xfrm>
-            <a:off x="8724900" y="365125"/>
+            <a:off x="8724899" y="365125"/>
             <a:ext cx="2628900" cy="5811838"/>
           </a:xfrm>
         </p:spPr>
@@ -515,10 +512,9 @@
           <a:lstStyle/>
           <a:p>
             <a:r>
-              <a:rPr lang="en-US" smtClean="0"/>
+              <a:rPr lang="en-US"/>
               <a:t>Click to edit Master title style</a:t>
             </a:r>
-            <a:endParaRPr lang="en-US"/>
           </a:p>
         </p:txBody>
       </p:sp>
@@ -534,7 +530,7 @@
         </p:nvSpPr>
         <p:spPr>
           <a:xfrm>
-            <a:off x="838200" y="365125"/>
+            <a:off x="838199" y="365125"/>
             <a:ext cx="7734300" cy="5811838"/>
           </a:xfrm>
         </p:spPr>
@@ -544,38 +540,37 @@
           <a:p>
             <a:pPr lvl="0"/>
             <a:r>
-              <a:rPr lang="en-US" smtClean="0"/>
+              <a:rPr lang="en-US"/>
               <a:t>Edit Master text styles</a:t>
             </a:r>
           </a:p>
           <a:p>
             <a:pPr lvl="1"/>
             <a:r>
-              <a:rPr lang="en-US" smtClean="0"/>
+              <a:rPr lang="en-US"/>
               <a:t>Second level</a:t>
             </a:r>
           </a:p>
           <a:p>
             <a:pPr lvl="2"/>
             <a:r>
-              <a:rPr lang="en-US" smtClean="0"/>
+              <a:rPr lang="en-US"/>
               <a:t>Third level</a:t>
             </a:r>
           </a:p>
           <a:p>
             <a:pPr lvl="3"/>
             <a:r>
-              <a:rPr lang="en-US" smtClean="0"/>
+              <a:rPr lang="en-US"/>
               <a:t>Fourth level</a:t>
             </a:r>
           </a:p>
           <a:p>
             <a:pPr lvl="4"/>
             <a:r>
-              <a:rPr lang="en-US" smtClean="0"/>
+              <a:rPr lang="en-US"/>
               <a:t>Fifth level</a:t>
             </a:r>
-            <a:endParaRPr lang="en-US"/>
           </a:p>
         </p:txBody>
       </p:sp>
@@ -596,7 +591,7 @@
           <a:p>
             <a:fld id="{27D73BDF-F17D-4684-ADBA-0C9D48FC2E7D}" type="datetimeFigureOut">
               <a:rPr lang="en-US" smtClean="0"/>
-              <a:t>5/15/2021</a:t>
+              <a:t>5/16/2021</a:t>
             </a:fld>
             <a:endParaRPr lang="en-US"/>
           </a:p>
@@ -690,10 +685,9 @@
           <a:lstStyle/>
           <a:p>
             <a:r>
-              <a:rPr lang="en-US" smtClean="0"/>
+              <a:rPr lang="en-US"/>
               <a:t>Click to edit Master title style</a:t>
             </a:r>
-            <a:endParaRPr lang="en-US"/>
           </a:p>
         </p:txBody>
       </p:sp>
@@ -714,38 +708,37 @@
           <a:p>
             <a:pPr lvl="0"/>
             <a:r>
-              <a:rPr lang="en-US" smtClean="0"/>
+              <a:rPr lang="en-US"/>
               <a:t>Edit Master text styles</a:t>
             </a:r>
           </a:p>
           <a:p>
             <a:pPr lvl="1"/>
             <a:r>
-              <a:rPr lang="en-US" smtClean="0"/>
+              <a:rPr lang="en-US"/>
               <a:t>Second level</a:t>
             </a:r>
           </a:p>
           <a:p>
             <a:pPr lvl="2"/>
             <a:r>
-              <a:rPr lang="en-US" smtClean="0"/>
+              <a:rPr lang="en-US"/>
               <a:t>Third level</a:t>
             </a:r>
           </a:p>
           <a:p>
             <a:pPr lvl="3"/>
             <a:r>
-              <a:rPr lang="en-US" smtClean="0"/>
+              <a:rPr lang="en-US"/>
               <a:t>Fourth level</a:t>
             </a:r>
           </a:p>
           <a:p>
             <a:pPr lvl="4"/>
             <a:r>
-              <a:rPr lang="en-US" smtClean="0"/>
+              <a:rPr lang="en-US"/>
               <a:t>Fifth level</a:t>
             </a:r>
-            <a:endParaRPr lang="en-US"/>
           </a:p>
         </p:txBody>
       </p:sp>
@@ -766,7 +759,7 @@
           <a:p>
             <a:fld id="{27D73BDF-F17D-4684-ADBA-0C9D48FC2E7D}" type="datetimeFigureOut">
               <a:rPr lang="en-US" smtClean="0"/>
-              <a:t>5/15/2021</a:t>
+              <a:t>5/16/2021</a:t>
             </a:fld>
             <a:endParaRPr lang="en-US"/>
           </a:p>
@@ -856,7 +849,7 @@
         </p:nvSpPr>
         <p:spPr>
           <a:xfrm>
-            <a:off x="831850" y="1709738"/>
+            <a:off x="831852" y="1709738"/>
             <a:ext cx="10515600" cy="2852737"/>
           </a:xfrm>
         </p:spPr>
@@ -869,10 +862,9 @@
           </a:lstStyle>
           <a:p>
             <a:r>
-              <a:rPr lang="en-US" smtClean="0"/>
+              <a:rPr lang="en-US"/>
               <a:t>Click to edit Master title style</a:t>
             </a:r>
-            <a:endParaRPr lang="en-US"/>
           </a:p>
         </p:txBody>
       </p:sp>
@@ -888,7 +880,7 @@
         </p:nvSpPr>
         <p:spPr>
           <a:xfrm>
-            <a:off x="831850" y="4589463"/>
+            <a:off x="831852" y="4589464"/>
             <a:ext cx="10515600" cy="1500187"/>
           </a:xfrm>
         </p:spPr>
@@ -905,7 +897,7 @@
                 </a:solidFill>
               </a:defRPr>
             </a:lvl1pPr>
-            <a:lvl2pPr marL="457200" indent="0">
+            <a:lvl2pPr marL="457206" indent="0">
               <a:buNone/>
               <a:defRPr sz="2000">
                 <a:solidFill>
@@ -915,7 +907,7 @@
                 </a:solidFill>
               </a:defRPr>
             </a:lvl2pPr>
-            <a:lvl3pPr marL="914400" indent="0">
+            <a:lvl3pPr marL="914411" indent="0">
               <a:buNone/>
               <a:defRPr sz="1800">
                 <a:solidFill>
@@ -925,7 +917,7 @@
                 </a:solidFill>
               </a:defRPr>
             </a:lvl3pPr>
-            <a:lvl4pPr marL="1371600" indent="0">
+            <a:lvl4pPr marL="1371617" indent="0">
               <a:buNone/>
               <a:defRPr sz="1600">
                 <a:solidFill>
@@ -935,7 +927,7 @@
                 </a:solidFill>
               </a:defRPr>
             </a:lvl4pPr>
-            <a:lvl5pPr marL="1828800" indent="0">
+            <a:lvl5pPr marL="1828823" indent="0">
               <a:buNone/>
               <a:defRPr sz="1600">
                 <a:solidFill>
@@ -945,7 +937,7 @@
                 </a:solidFill>
               </a:defRPr>
             </a:lvl5pPr>
-            <a:lvl6pPr marL="2286000" indent="0">
+            <a:lvl6pPr marL="2286029" indent="0">
               <a:buNone/>
               <a:defRPr sz="1600">
                 <a:solidFill>
@@ -955,7 +947,7 @@
                 </a:solidFill>
               </a:defRPr>
             </a:lvl6pPr>
-            <a:lvl7pPr marL="2743200" indent="0">
+            <a:lvl7pPr marL="2743234" indent="0">
               <a:buNone/>
               <a:defRPr sz="1600">
                 <a:solidFill>
@@ -965,7 +957,7 @@
                 </a:solidFill>
               </a:defRPr>
             </a:lvl7pPr>
-            <a:lvl8pPr marL="3200400" indent="0">
+            <a:lvl8pPr marL="3200440" indent="0">
               <a:buNone/>
               <a:defRPr sz="1600">
                 <a:solidFill>
@@ -975,7 +967,7 @@
                 </a:solidFill>
               </a:defRPr>
             </a:lvl8pPr>
-            <a:lvl9pPr marL="3657600" indent="0">
+            <a:lvl9pPr marL="3657646" indent="0">
               <a:buNone/>
               <a:defRPr sz="1600">
                 <a:solidFill>
@@ -989,7 +981,7 @@
           <a:p>
             <a:pPr lvl="0"/>
             <a:r>
-              <a:rPr lang="en-US" smtClean="0"/>
+              <a:rPr lang="en-US"/>
               <a:t>Edit Master text styles</a:t>
             </a:r>
           </a:p>
@@ -1012,7 +1004,7 @@
           <a:p>
             <a:fld id="{27D73BDF-F17D-4684-ADBA-0C9D48FC2E7D}" type="datetimeFigureOut">
               <a:rPr lang="en-US" smtClean="0"/>
-              <a:t>5/15/2021</a:t>
+              <a:t>5/16/2021</a:t>
             </a:fld>
             <a:endParaRPr lang="en-US"/>
           </a:p>
@@ -1106,10 +1098,9 @@
           <a:lstStyle/>
           <a:p>
             <a:r>
-              <a:rPr lang="en-US" smtClean="0"/>
+              <a:rPr lang="en-US"/>
               <a:t>Click to edit Master title style</a:t>
             </a:r>
-            <a:endParaRPr lang="en-US"/>
           </a:p>
         </p:txBody>
       </p:sp>
@@ -1125,7 +1116,7 @@
         </p:nvSpPr>
         <p:spPr>
           <a:xfrm>
-            <a:off x="838200" y="1825625"/>
+            <a:off x="838201" y="1825625"/>
             <a:ext cx="5181600" cy="4351338"/>
           </a:xfrm>
         </p:spPr>
@@ -1135,38 +1126,37 @@
           <a:p>
             <a:pPr lvl="0"/>
             <a:r>
-              <a:rPr lang="en-US" smtClean="0"/>
+              <a:rPr lang="en-US"/>
               <a:t>Edit Master text styles</a:t>
             </a:r>
           </a:p>
           <a:p>
             <a:pPr lvl="1"/>
             <a:r>
-              <a:rPr lang="en-US" smtClean="0"/>
+              <a:rPr lang="en-US"/>
               <a:t>Second level</a:t>
             </a:r>
           </a:p>
           <a:p>
             <a:pPr lvl="2"/>
             <a:r>
-              <a:rPr lang="en-US" smtClean="0"/>
+              <a:rPr lang="en-US"/>
               <a:t>Third level</a:t>
             </a:r>
           </a:p>
           <a:p>
             <a:pPr lvl="3"/>
             <a:r>
-              <a:rPr lang="en-US" smtClean="0"/>
+              <a:rPr lang="en-US"/>
               <a:t>Fourth level</a:t>
             </a:r>
           </a:p>
           <a:p>
             <a:pPr lvl="4"/>
             <a:r>
-              <a:rPr lang="en-US" smtClean="0"/>
+              <a:rPr lang="en-US"/>
               <a:t>Fifth level</a:t>
             </a:r>
-            <a:endParaRPr lang="en-US"/>
           </a:p>
         </p:txBody>
       </p:sp>
@@ -1182,7 +1172,7 @@
         </p:nvSpPr>
         <p:spPr>
           <a:xfrm>
-            <a:off x="6172200" y="1825625"/>
+            <a:off x="6172201" y="1825625"/>
             <a:ext cx="5181600" cy="4351338"/>
           </a:xfrm>
         </p:spPr>
@@ -1192,38 +1182,37 @@
           <a:p>
             <a:pPr lvl="0"/>
             <a:r>
-              <a:rPr lang="en-US" smtClean="0"/>
+              <a:rPr lang="en-US"/>
               <a:t>Edit Master text styles</a:t>
             </a:r>
           </a:p>
           <a:p>
             <a:pPr lvl="1"/>
             <a:r>
-              <a:rPr lang="en-US" smtClean="0"/>
+              <a:rPr lang="en-US"/>
               <a:t>Second level</a:t>
             </a:r>
           </a:p>
           <a:p>
             <a:pPr lvl="2"/>
             <a:r>
-              <a:rPr lang="en-US" smtClean="0"/>
+              <a:rPr lang="en-US"/>
               <a:t>Third level</a:t>
             </a:r>
           </a:p>
           <a:p>
             <a:pPr lvl="3"/>
             <a:r>
-              <a:rPr lang="en-US" smtClean="0"/>
+              <a:rPr lang="en-US"/>
               <a:t>Fourth level</a:t>
             </a:r>
           </a:p>
           <a:p>
             <a:pPr lvl="4"/>
             <a:r>
-              <a:rPr lang="en-US" smtClean="0"/>
+              <a:rPr lang="en-US"/>
               <a:t>Fifth level</a:t>
             </a:r>
-            <a:endParaRPr lang="en-US"/>
           </a:p>
         </p:txBody>
       </p:sp>
@@ -1244,7 +1233,7 @@
           <a:p>
             <a:fld id="{27D73BDF-F17D-4684-ADBA-0C9D48FC2E7D}" type="datetimeFigureOut">
               <a:rPr lang="en-US" smtClean="0"/>
-              <a:t>5/15/2021</a:t>
+              <a:t>5/16/2021</a:t>
             </a:fld>
             <a:endParaRPr lang="en-US"/>
           </a:p>
@@ -1334,7 +1323,7 @@
         </p:nvSpPr>
         <p:spPr>
           <a:xfrm>
-            <a:off x="839788" y="365125"/>
+            <a:off x="839789" y="365125"/>
             <a:ext cx="10515600" cy="1325563"/>
           </a:xfrm>
         </p:spPr>
@@ -1343,10 +1332,9 @@
           <a:lstStyle/>
           <a:p>
             <a:r>
-              <a:rPr lang="en-US" smtClean="0"/>
+              <a:rPr lang="en-US"/>
               <a:t>Click to edit Master title style</a:t>
             </a:r>
-            <a:endParaRPr lang="en-US"/>
           </a:p>
         </p:txBody>
       </p:sp>
@@ -1362,7 +1350,7 @@
         </p:nvSpPr>
         <p:spPr>
           <a:xfrm>
-            <a:off x="839788" y="1681163"/>
+            <a:off x="839789" y="1681163"/>
             <a:ext cx="5157787" cy="823912"/>
           </a:xfrm>
         </p:spPr>
@@ -1373,35 +1361,35 @@
               <a:buNone/>
               <a:defRPr sz="2400" b="1"/>
             </a:lvl1pPr>
-            <a:lvl2pPr marL="457200" indent="0">
+            <a:lvl2pPr marL="457206" indent="0">
               <a:buNone/>
               <a:defRPr sz="2000" b="1"/>
             </a:lvl2pPr>
-            <a:lvl3pPr marL="914400" indent="0">
+            <a:lvl3pPr marL="914411" indent="0">
               <a:buNone/>
               <a:defRPr sz="1800" b="1"/>
             </a:lvl3pPr>
-            <a:lvl4pPr marL="1371600" indent="0">
+            <a:lvl4pPr marL="1371617" indent="0">
               <a:buNone/>
               <a:defRPr sz="1600" b="1"/>
             </a:lvl4pPr>
-            <a:lvl5pPr marL="1828800" indent="0">
+            <a:lvl5pPr marL="1828823" indent="0">
               <a:buNone/>
               <a:defRPr sz="1600" b="1"/>
             </a:lvl5pPr>
-            <a:lvl6pPr marL="2286000" indent="0">
+            <a:lvl6pPr marL="2286029" indent="0">
               <a:buNone/>
               <a:defRPr sz="1600" b="1"/>
             </a:lvl6pPr>
-            <a:lvl7pPr marL="2743200" indent="0">
+            <a:lvl7pPr marL="2743234" indent="0">
               <a:buNone/>
               <a:defRPr sz="1600" b="1"/>
             </a:lvl7pPr>
-            <a:lvl8pPr marL="3200400" indent="0">
+            <a:lvl8pPr marL="3200440" indent="0">
               <a:buNone/>
               <a:defRPr sz="1600" b="1"/>
             </a:lvl8pPr>
-            <a:lvl9pPr marL="3657600" indent="0">
+            <a:lvl9pPr marL="3657646" indent="0">
               <a:buNone/>
               <a:defRPr sz="1600" b="1"/>
             </a:lvl9pPr>
@@ -1409,7 +1397,7 @@
           <a:p>
             <a:pPr lvl="0"/>
             <a:r>
-              <a:rPr lang="en-US" smtClean="0"/>
+              <a:rPr lang="en-US"/>
               <a:t>Edit Master text styles</a:t>
             </a:r>
           </a:p>
@@ -1427,7 +1415,7 @@
         </p:nvSpPr>
         <p:spPr>
           <a:xfrm>
-            <a:off x="839788" y="2505075"/>
+            <a:off x="839789" y="2505076"/>
             <a:ext cx="5157787" cy="3684588"/>
           </a:xfrm>
         </p:spPr>
@@ -1437,38 +1425,37 @@
           <a:p>
             <a:pPr lvl="0"/>
             <a:r>
-              <a:rPr lang="en-US" smtClean="0"/>
+              <a:rPr lang="en-US"/>
               <a:t>Edit Master text styles</a:t>
             </a:r>
           </a:p>
           <a:p>
             <a:pPr lvl="1"/>
             <a:r>
-              <a:rPr lang="en-US" smtClean="0"/>
+              <a:rPr lang="en-US"/>
               <a:t>Second level</a:t>
             </a:r>
           </a:p>
           <a:p>
             <a:pPr lvl="2"/>
             <a:r>
-              <a:rPr lang="en-US" smtClean="0"/>
+              <a:rPr lang="en-US"/>
               <a:t>Third level</a:t>
             </a:r>
           </a:p>
           <a:p>
             <a:pPr lvl="3"/>
             <a:r>
-              <a:rPr lang="en-US" smtClean="0"/>
+              <a:rPr lang="en-US"/>
               <a:t>Fourth level</a:t>
             </a:r>
           </a:p>
           <a:p>
             <a:pPr lvl="4"/>
             <a:r>
-              <a:rPr lang="en-US" smtClean="0"/>
+              <a:rPr lang="en-US"/>
               <a:t>Fifth level</a:t>
             </a:r>
-            <a:endParaRPr lang="en-US"/>
           </a:p>
         </p:txBody>
       </p:sp>
@@ -1484,7 +1471,7 @@
         </p:nvSpPr>
         <p:spPr>
           <a:xfrm>
-            <a:off x="6172200" y="1681163"/>
+            <a:off x="6172202" y="1681163"/>
             <a:ext cx="5183188" cy="823912"/>
           </a:xfrm>
         </p:spPr>
@@ -1495,35 +1482,35 @@
               <a:buNone/>
               <a:defRPr sz="2400" b="1"/>
             </a:lvl1pPr>
-            <a:lvl2pPr marL="457200" indent="0">
+            <a:lvl2pPr marL="457206" indent="0">
               <a:buNone/>
               <a:defRPr sz="2000" b="1"/>
             </a:lvl2pPr>
-            <a:lvl3pPr marL="914400" indent="0">
+            <a:lvl3pPr marL="914411" indent="0">
               <a:buNone/>
               <a:defRPr sz="1800" b="1"/>
             </a:lvl3pPr>
-            <a:lvl4pPr marL="1371600" indent="0">
+            <a:lvl4pPr marL="1371617" indent="0">
               <a:buNone/>
               <a:defRPr sz="1600" b="1"/>
             </a:lvl4pPr>
-            <a:lvl5pPr marL="1828800" indent="0">
+            <a:lvl5pPr marL="1828823" indent="0">
               <a:buNone/>
               <a:defRPr sz="1600" b="1"/>
             </a:lvl5pPr>
-            <a:lvl6pPr marL="2286000" indent="0">
+            <a:lvl6pPr marL="2286029" indent="0">
               <a:buNone/>
               <a:defRPr sz="1600" b="1"/>
             </a:lvl6pPr>
-            <a:lvl7pPr marL="2743200" indent="0">
+            <a:lvl7pPr marL="2743234" indent="0">
               <a:buNone/>
               <a:defRPr sz="1600" b="1"/>
             </a:lvl7pPr>
-            <a:lvl8pPr marL="3200400" indent="0">
+            <a:lvl8pPr marL="3200440" indent="0">
               <a:buNone/>
               <a:defRPr sz="1600" b="1"/>
             </a:lvl8pPr>
-            <a:lvl9pPr marL="3657600" indent="0">
+            <a:lvl9pPr marL="3657646" indent="0">
               <a:buNone/>
               <a:defRPr sz="1600" b="1"/>
             </a:lvl9pPr>
@@ -1531,7 +1518,7 @@
           <a:p>
             <a:pPr lvl="0"/>
             <a:r>
-              <a:rPr lang="en-US" smtClean="0"/>
+              <a:rPr lang="en-US"/>
               <a:t>Edit Master text styles</a:t>
             </a:r>
           </a:p>
@@ -1549,7 +1536,7 @@
         </p:nvSpPr>
         <p:spPr>
           <a:xfrm>
-            <a:off x="6172200" y="2505075"/>
+            <a:off x="6172202" y="2505076"/>
             <a:ext cx="5183188" cy="3684588"/>
           </a:xfrm>
         </p:spPr>
@@ -1559,38 +1546,37 @@
           <a:p>
             <a:pPr lvl="0"/>
             <a:r>
-              <a:rPr lang="en-US" smtClean="0"/>
+              <a:rPr lang="en-US"/>
               <a:t>Edit Master text styles</a:t>
             </a:r>
           </a:p>
           <a:p>
             <a:pPr lvl="1"/>
             <a:r>
-              <a:rPr lang="en-US" smtClean="0"/>
+              <a:rPr lang="en-US"/>
               <a:t>Second level</a:t>
             </a:r>
           </a:p>
           <a:p>
             <a:pPr lvl="2"/>
             <a:r>
-              <a:rPr lang="en-US" smtClean="0"/>
+              <a:rPr lang="en-US"/>
               <a:t>Third level</a:t>
             </a:r>
           </a:p>
           <a:p>
             <a:pPr lvl="3"/>
             <a:r>
-              <a:rPr lang="en-US" smtClean="0"/>
+              <a:rPr lang="en-US"/>
               <a:t>Fourth level</a:t>
             </a:r>
           </a:p>
           <a:p>
             <a:pPr lvl="4"/>
             <a:r>
-              <a:rPr lang="en-US" smtClean="0"/>
+              <a:rPr lang="en-US"/>
               <a:t>Fifth level</a:t>
             </a:r>
-            <a:endParaRPr lang="en-US"/>
           </a:p>
         </p:txBody>
       </p:sp>
@@ -1611,7 +1597,7 @@
           <a:p>
             <a:fld id="{27D73BDF-F17D-4684-ADBA-0C9D48FC2E7D}" type="datetimeFigureOut">
               <a:rPr lang="en-US" smtClean="0"/>
-              <a:t>5/15/2021</a:t>
+              <a:t>5/16/2021</a:t>
             </a:fld>
             <a:endParaRPr lang="en-US"/>
           </a:p>
@@ -1705,10 +1691,9 @@
           <a:lstStyle/>
           <a:p>
             <a:r>
-              <a:rPr lang="en-US" smtClean="0"/>
+              <a:rPr lang="en-US"/>
               <a:t>Click to edit Master title style</a:t>
             </a:r>
-            <a:endParaRPr lang="en-US"/>
           </a:p>
         </p:txBody>
       </p:sp>
@@ -1729,7 +1714,7 @@
           <a:p>
             <a:fld id="{27D73BDF-F17D-4684-ADBA-0C9D48FC2E7D}" type="datetimeFigureOut">
               <a:rPr lang="en-US" smtClean="0"/>
-              <a:t>5/15/2021</a:t>
+              <a:t>5/16/2021</a:t>
             </a:fld>
             <a:endParaRPr lang="en-US"/>
           </a:p>
@@ -1824,7 +1809,7 @@
           <a:p>
             <a:fld id="{27D73BDF-F17D-4684-ADBA-0C9D48FC2E7D}" type="datetimeFigureOut">
               <a:rPr lang="en-US" smtClean="0"/>
-              <a:t>5/15/2021</a:t>
+              <a:t>5/16/2021</a:t>
             </a:fld>
             <a:endParaRPr lang="en-US"/>
           </a:p>
@@ -1914,8 +1899,8 @@
         </p:nvSpPr>
         <p:spPr>
           <a:xfrm>
-            <a:off x="839788" y="457200"/>
-            <a:ext cx="3932237" cy="1600200"/>
+            <a:off x="839790" y="457200"/>
+            <a:ext cx="3932236" cy="1600200"/>
           </a:xfrm>
         </p:spPr>
         <p:txBody>
@@ -1927,10 +1912,9 @@
           </a:lstStyle>
           <a:p>
             <a:r>
-              <a:rPr lang="en-US" smtClean="0"/>
+              <a:rPr lang="en-US"/>
               <a:t>Click to edit Master title style</a:t>
             </a:r>
-            <a:endParaRPr lang="en-US"/>
           </a:p>
         </p:txBody>
       </p:sp>
@@ -1947,7 +1931,7 @@
         <p:spPr>
           <a:xfrm>
             <a:off x="5183188" y="987425"/>
-            <a:ext cx="6172200" cy="4873625"/>
+            <a:ext cx="6172201" cy="4873625"/>
           </a:xfrm>
         </p:spPr>
         <p:txBody>
@@ -1984,38 +1968,37 @@
           <a:p>
             <a:pPr lvl="0"/>
             <a:r>
-              <a:rPr lang="en-US" smtClean="0"/>
+              <a:rPr lang="en-US"/>
               <a:t>Edit Master text styles</a:t>
             </a:r>
           </a:p>
           <a:p>
             <a:pPr lvl="1"/>
             <a:r>
-              <a:rPr lang="en-US" smtClean="0"/>
+              <a:rPr lang="en-US"/>
               <a:t>Second level</a:t>
             </a:r>
           </a:p>
           <a:p>
             <a:pPr lvl="2"/>
             <a:r>
-              <a:rPr lang="en-US" smtClean="0"/>
+              <a:rPr lang="en-US"/>
               <a:t>Third level</a:t>
             </a:r>
           </a:p>
           <a:p>
             <a:pPr lvl="3"/>
             <a:r>
-              <a:rPr lang="en-US" smtClean="0"/>
+              <a:rPr lang="en-US"/>
               <a:t>Fourth level</a:t>
             </a:r>
           </a:p>
           <a:p>
             <a:pPr lvl="4"/>
             <a:r>
-              <a:rPr lang="en-US" smtClean="0"/>
+              <a:rPr lang="en-US"/>
               <a:t>Fifth level</a:t>
             </a:r>
-            <a:endParaRPr lang="en-US"/>
           </a:p>
         </p:txBody>
       </p:sp>
@@ -2031,8 +2014,8 @@
         </p:nvSpPr>
         <p:spPr>
           <a:xfrm>
-            <a:off x="839788" y="2057400"/>
-            <a:ext cx="3932237" cy="3811588"/>
+            <a:off x="839790" y="2057400"/>
+            <a:ext cx="3932236" cy="3811588"/>
           </a:xfrm>
         </p:spPr>
         <p:txBody>
@@ -2042,35 +2025,35 @@
               <a:buNone/>
               <a:defRPr sz="1600"/>
             </a:lvl1pPr>
-            <a:lvl2pPr marL="457200" indent="0">
+            <a:lvl2pPr marL="457206" indent="0">
               <a:buNone/>
               <a:defRPr sz="1400"/>
             </a:lvl2pPr>
-            <a:lvl3pPr marL="914400" indent="0">
+            <a:lvl3pPr marL="914411" indent="0">
               <a:buNone/>
               <a:defRPr sz="1200"/>
             </a:lvl3pPr>
-            <a:lvl4pPr marL="1371600" indent="0">
+            <a:lvl4pPr marL="1371617" indent="0">
               <a:buNone/>
               <a:defRPr sz="1000"/>
             </a:lvl4pPr>
-            <a:lvl5pPr marL="1828800" indent="0">
+            <a:lvl5pPr marL="1828823" indent="0">
               <a:buNone/>
               <a:defRPr sz="1000"/>
             </a:lvl5pPr>
-            <a:lvl6pPr marL="2286000" indent="0">
+            <a:lvl6pPr marL="2286029" indent="0">
               <a:buNone/>
               <a:defRPr sz="1000"/>
             </a:lvl6pPr>
-            <a:lvl7pPr marL="2743200" indent="0">
+            <a:lvl7pPr marL="2743234" indent="0">
               <a:buNone/>
               <a:defRPr sz="1000"/>
             </a:lvl7pPr>
-            <a:lvl8pPr marL="3200400" indent="0">
+            <a:lvl8pPr marL="3200440" indent="0">
               <a:buNone/>
               <a:defRPr sz="1000"/>
             </a:lvl8pPr>
-            <a:lvl9pPr marL="3657600" indent="0">
+            <a:lvl9pPr marL="3657646" indent="0">
               <a:buNone/>
               <a:defRPr sz="1000"/>
             </a:lvl9pPr>
@@ -2078,7 +2061,7 @@
           <a:p>
             <a:pPr lvl="0"/>
             <a:r>
-              <a:rPr lang="en-US" smtClean="0"/>
+              <a:rPr lang="en-US"/>
               <a:t>Edit Master text styles</a:t>
             </a:r>
           </a:p>
@@ -2101,7 +2084,7 @@
           <a:p>
             <a:fld id="{27D73BDF-F17D-4684-ADBA-0C9D48FC2E7D}" type="datetimeFigureOut">
               <a:rPr lang="en-US" smtClean="0"/>
-              <a:t>5/15/2021</a:t>
+              <a:t>5/16/2021</a:t>
             </a:fld>
             <a:endParaRPr lang="en-US"/>
           </a:p>
@@ -2191,8 +2174,8 @@
         </p:nvSpPr>
         <p:spPr>
           <a:xfrm>
-            <a:off x="839788" y="457200"/>
-            <a:ext cx="3932237" cy="1600200"/>
+            <a:off x="839790" y="457200"/>
+            <a:ext cx="3932236" cy="1600200"/>
           </a:xfrm>
         </p:spPr>
         <p:txBody>
@@ -2204,10 +2187,9 @@
           </a:lstStyle>
           <a:p>
             <a:r>
-              <a:rPr lang="en-US" smtClean="0"/>
+              <a:rPr lang="en-US"/>
               <a:t>Click to edit Master title style</a:t>
             </a:r>
-            <a:endParaRPr lang="en-US"/>
           </a:p>
         </p:txBody>
       </p:sp>
@@ -2224,7 +2206,7 @@
         <p:spPr>
           <a:xfrm>
             <a:off x="5183188" y="987425"/>
-            <a:ext cx="6172200" cy="4873625"/>
+            <a:ext cx="6172201" cy="4873625"/>
           </a:xfrm>
         </p:spPr>
         <p:txBody>
@@ -2234,35 +2216,35 @@
               <a:buNone/>
               <a:defRPr sz="3200"/>
             </a:lvl1pPr>
-            <a:lvl2pPr marL="457200" indent="0">
+            <a:lvl2pPr marL="457206" indent="0">
               <a:buNone/>
               <a:defRPr sz="2800"/>
             </a:lvl2pPr>
-            <a:lvl3pPr marL="914400" indent="0">
+            <a:lvl3pPr marL="914411" indent="0">
               <a:buNone/>
               <a:defRPr sz="2400"/>
             </a:lvl3pPr>
-            <a:lvl4pPr marL="1371600" indent="0">
+            <a:lvl4pPr marL="1371617" indent="0">
               <a:buNone/>
               <a:defRPr sz="2000"/>
             </a:lvl4pPr>
-            <a:lvl5pPr marL="1828800" indent="0">
+            <a:lvl5pPr marL="1828823" indent="0">
               <a:buNone/>
               <a:defRPr sz="2000"/>
             </a:lvl5pPr>
-            <a:lvl6pPr marL="2286000" indent="0">
+            <a:lvl6pPr marL="2286029" indent="0">
               <a:buNone/>
               <a:defRPr sz="2000"/>
             </a:lvl6pPr>
-            <a:lvl7pPr marL="2743200" indent="0">
+            <a:lvl7pPr marL="2743234" indent="0">
               <a:buNone/>
               <a:defRPr sz="2000"/>
             </a:lvl7pPr>
-            <a:lvl8pPr marL="3200400" indent="0">
+            <a:lvl8pPr marL="3200440" indent="0">
               <a:buNone/>
               <a:defRPr sz="2000"/>
             </a:lvl8pPr>
-            <a:lvl9pPr marL="3657600" indent="0">
+            <a:lvl9pPr marL="3657646" indent="0">
               <a:buNone/>
               <a:defRPr sz="2000"/>
             </a:lvl9pPr>
@@ -2284,8 +2266,8 @@
         </p:nvSpPr>
         <p:spPr>
           <a:xfrm>
-            <a:off x="839788" y="2057400"/>
-            <a:ext cx="3932237" cy="3811588"/>
+            <a:off x="839790" y="2057400"/>
+            <a:ext cx="3932236" cy="3811588"/>
           </a:xfrm>
         </p:spPr>
         <p:txBody>
@@ -2295,35 +2277,35 @@
               <a:buNone/>
               <a:defRPr sz="1600"/>
             </a:lvl1pPr>
-            <a:lvl2pPr marL="457200" indent="0">
+            <a:lvl2pPr marL="457206" indent="0">
               <a:buNone/>
               <a:defRPr sz="1400"/>
             </a:lvl2pPr>
-            <a:lvl3pPr marL="914400" indent="0">
+            <a:lvl3pPr marL="914411" indent="0">
               <a:buNone/>
               <a:defRPr sz="1200"/>
             </a:lvl3pPr>
-            <a:lvl4pPr marL="1371600" indent="0">
+            <a:lvl4pPr marL="1371617" indent="0">
               <a:buNone/>
               <a:defRPr sz="1000"/>
             </a:lvl4pPr>
-            <a:lvl5pPr marL="1828800" indent="0">
+            <a:lvl5pPr marL="1828823" indent="0">
               <a:buNone/>
               <a:defRPr sz="1000"/>
             </a:lvl5pPr>
-            <a:lvl6pPr marL="2286000" indent="0">
+            <a:lvl6pPr marL="2286029" indent="0">
               <a:buNone/>
               <a:defRPr sz="1000"/>
             </a:lvl6pPr>
-            <a:lvl7pPr marL="2743200" indent="0">
+            <a:lvl7pPr marL="2743234" indent="0">
               <a:buNone/>
               <a:defRPr sz="1000"/>
             </a:lvl7pPr>
-            <a:lvl8pPr marL="3200400" indent="0">
+            <a:lvl8pPr marL="3200440" indent="0">
               <a:buNone/>
               <a:defRPr sz="1000"/>
             </a:lvl8pPr>
-            <a:lvl9pPr marL="3657600" indent="0">
+            <a:lvl9pPr marL="3657646" indent="0">
               <a:buNone/>
               <a:defRPr sz="1000"/>
             </a:lvl9pPr>
@@ -2331,7 +2313,7 @@
           <a:p>
             <a:pPr lvl="0"/>
             <a:r>
-              <a:rPr lang="en-US" smtClean="0"/>
+              <a:rPr lang="en-US"/>
               <a:t>Edit Master text styles</a:t>
             </a:r>
           </a:p>
@@ -2354,7 +2336,7 @@
           <a:p>
             <a:fld id="{27D73BDF-F17D-4684-ADBA-0C9D48FC2E7D}" type="datetimeFigureOut">
               <a:rPr lang="en-US" smtClean="0"/>
-              <a:t>5/15/2021</a:t>
+              <a:t>5/16/2021</a:t>
             </a:fld>
             <a:endParaRPr lang="en-US"/>
           </a:p>
@@ -2449,7 +2431,7 @@
         </p:nvSpPr>
         <p:spPr>
           <a:xfrm>
-            <a:off x="838200" y="365125"/>
+            <a:off x="838202" y="365125"/>
             <a:ext cx="10515600" cy="1325563"/>
           </a:xfrm>
           <a:prstGeom prst="rect">
@@ -2463,10 +2445,9 @@
           <a:lstStyle/>
           <a:p>
             <a:r>
-              <a:rPr lang="en-US" smtClean="0"/>
+              <a:rPr lang="en-US"/>
               <a:t>Click to edit Master title style</a:t>
             </a:r>
-            <a:endParaRPr lang="en-US"/>
           </a:p>
         </p:txBody>
       </p:sp>
@@ -2482,7 +2463,7 @@
         </p:nvSpPr>
         <p:spPr>
           <a:xfrm>
-            <a:off x="838200" y="1825625"/>
+            <a:off x="838202" y="1825625"/>
             <a:ext cx="10515600" cy="4351338"/>
           </a:xfrm>
           <a:prstGeom prst="rect">
@@ -2497,38 +2478,37 @@
           <a:p>
             <a:pPr lvl="0"/>
             <a:r>
-              <a:rPr lang="en-US" smtClean="0"/>
+              <a:rPr lang="en-US"/>
               <a:t>Edit Master text styles</a:t>
             </a:r>
           </a:p>
           <a:p>
             <a:pPr lvl="1"/>
             <a:r>
-              <a:rPr lang="en-US" smtClean="0"/>
+              <a:rPr lang="en-US"/>
               <a:t>Second level</a:t>
             </a:r>
           </a:p>
           <a:p>
             <a:pPr lvl="2"/>
             <a:r>
-              <a:rPr lang="en-US" smtClean="0"/>
+              <a:rPr lang="en-US"/>
               <a:t>Third level</a:t>
             </a:r>
           </a:p>
           <a:p>
             <a:pPr lvl="3"/>
             <a:r>
-              <a:rPr lang="en-US" smtClean="0"/>
+              <a:rPr lang="en-US"/>
               <a:t>Fourth level</a:t>
             </a:r>
           </a:p>
           <a:p>
             <a:pPr lvl="4"/>
             <a:r>
-              <a:rPr lang="en-US" smtClean="0"/>
+              <a:rPr lang="en-US"/>
               <a:t>Fifth level</a:t>
             </a:r>
-            <a:endParaRPr lang="en-US"/>
           </a:p>
         </p:txBody>
       </p:sp>
@@ -2544,7 +2524,7 @@
         </p:nvSpPr>
         <p:spPr>
           <a:xfrm>
-            <a:off x="838200" y="6356350"/>
+            <a:off x="838201" y="6356351"/>
             <a:ext cx="2743200" cy="365125"/>
           </a:xfrm>
           <a:prstGeom prst="rect">
@@ -2567,7 +2547,7 @@
           <a:p>
             <a:fld id="{27D73BDF-F17D-4684-ADBA-0C9D48FC2E7D}" type="datetimeFigureOut">
               <a:rPr lang="en-US" smtClean="0"/>
-              <a:t>5/15/2021</a:t>
+              <a:t>5/16/2021</a:t>
             </a:fld>
             <a:endParaRPr lang="en-US"/>
           </a:p>
@@ -2585,7 +2565,7 @@
         </p:nvSpPr>
         <p:spPr>
           <a:xfrm>
-            <a:off x="4038600" y="6356350"/>
+            <a:off x="4038602" y="6356351"/>
             <a:ext cx="4114800" cy="365125"/>
           </a:xfrm>
           <a:prstGeom prst="rect">
@@ -2622,7 +2602,7 @@
         </p:nvSpPr>
         <p:spPr>
           <a:xfrm>
-            <a:off x="8610600" y="6356350"/>
+            <a:off x="8610601" y="6356351"/>
             <a:ext cx="2743200" cy="365125"/>
           </a:xfrm>
           <a:prstGeom prst="rect">
@@ -2674,7 +2654,7 @@
   </p:sldLayoutIdLst>
   <p:txStyles>
     <p:titleStyle>
-      <a:lvl1pPr algn="l" defTabSz="914400" rtl="0" eaLnBrk="1" latinLnBrk="0" hangingPunct="1">
+      <a:lvl1pPr algn="l" defTabSz="914411" rtl="0" eaLnBrk="1" latinLnBrk="0" hangingPunct="1">
         <a:lnSpc>
           <a:spcPct val="90000"/>
         </a:lnSpc>
@@ -2693,7 +2673,7 @@
       </a:lvl1pPr>
     </p:titleStyle>
     <p:bodyStyle>
-      <a:lvl1pPr marL="228600" indent="-228600" algn="l" defTabSz="914400" rtl="0" eaLnBrk="1" latinLnBrk="0" hangingPunct="1">
+      <a:lvl1pPr marL="228603" indent="-228603" algn="l" defTabSz="914411" rtl="0" eaLnBrk="1" latinLnBrk="0" hangingPunct="1">
         <a:lnSpc>
           <a:spcPct val="90000"/>
         </a:lnSpc>
@@ -2711,7 +2691,7 @@
           <a:cs typeface="+mn-cs"/>
         </a:defRPr>
       </a:lvl1pPr>
-      <a:lvl2pPr marL="685800" indent="-228600" algn="l" defTabSz="914400" rtl="0" eaLnBrk="1" latinLnBrk="0" hangingPunct="1">
+      <a:lvl2pPr marL="685808" indent="-228603" algn="l" defTabSz="914411" rtl="0" eaLnBrk="1" latinLnBrk="0" hangingPunct="1">
         <a:lnSpc>
           <a:spcPct val="90000"/>
         </a:lnSpc>
@@ -2729,7 +2709,7 @@
           <a:cs typeface="+mn-cs"/>
         </a:defRPr>
       </a:lvl2pPr>
-      <a:lvl3pPr marL="1143000" indent="-228600" algn="l" defTabSz="914400" rtl="0" eaLnBrk="1" latinLnBrk="0" hangingPunct="1">
+      <a:lvl3pPr marL="1143014" indent="-228603" algn="l" defTabSz="914411" rtl="0" eaLnBrk="1" latinLnBrk="0" hangingPunct="1">
         <a:lnSpc>
           <a:spcPct val="90000"/>
         </a:lnSpc>
@@ -2747,7 +2727,7 @@
           <a:cs typeface="+mn-cs"/>
         </a:defRPr>
       </a:lvl3pPr>
-      <a:lvl4pPr marL="1600200" indent="-228600" algn="l" defTabSz="914400" rtl="0" eaLnBrk="1" latinLnBrk="0" hangingPunct="1">
+      <a:lvl4pPr marL="1600220" indent="-228603" algn="l" defTabSz="914411" rtl="0" eaLnBrk="1" latinLnBrk="0" hangingPunct="1">
         <a:lnSpc>
           <a:spcPct val="90000"/>
         </a:lnSpc>
@@ -2765,7 +2745,7 @@
           <a:cs typeface="+mn-cs"/>
         </a:defRPr>
       </a:lvl4pPr>
-      <a:lvl5pPr marL="2057400" indent="-228600" algn="l" defTabSz="914400" rtl="0" eaLnBrk="1" latinLnBrk="0" hangingPunct="1">
+      <a:lvl5pPr marL="2057426" indent="-228603" algn="l" defTabSz="914411" rtl="0" eaLnBrk="1" latinLnBrk="0" hangingPunct="1">
         <a:lnSpc>
           <a:spcPct val="90000"/>
         </a:lnSpc>
@@ -2783,7 +2763,7 @@
           <a:cs typeface="+mn-cs"/>
         </a:defRPr>
       </a:lvl5pPr>
-      <a:lvl6pPr marL="2514600" indent="-228600" algn="l" defTabSz="914400" rtl="0" eaLnBrk="1" latinLnBrk="0" hangingPunct="1">
+      <a:lvl6pPr marL="2514632" indent="-228603" algn="l" defTabSz="914411" rtl="0" eaLnBrk="1" latinLnBrk="0" hangingPunct="1">
         <a:lnSpc>
           <a:spcPct val="90000"/>
         </a:lnSpc>
@@ -2801,7 +2781,7 @@
           <a:cs typeface="+mn-cs"/>
         </a:defRPr>
       </a:lvl6pPr>
-      <a:lvl7pPr marL="2971800" indent="-228600" algn="l" defTabSz="914400" rtl="0" eaLnBrk="1" latinLnBrk="0" hangingPunct="1">
+      <a:lvl7pPr marL="2971837" indent="-228603" algn="l" defTabSz="914411" rtl="0" eaLnBrk="1" latinLnBrk="0" hangingPunct="1">
         <a:lnSpc>
           <a:spcPct val="90000"/>
         </a:lnSpc>
@@ -2819,7 +2799,7 @@
           <a:cs typeface="+mn-cs"/>
         </a:defRPr>
       </a:lvl7pPr>
-      <a:lvl8pPr marL="3429000" indent="-228600" algn="l" defTabSz="914400" rtl="0" eaLnBrk="1" latinLnBrk="0" hangingPunct="1">
+      <a:lvl8pPr marL="3429043" indent="-228603" algn="l" defTabSz="914411" rtl="0" eaLnBrk="1" latinLnBrk="0" hangingPunct="1">
         <a:lnSpc>
           <a:spcPct val="90000"/>
         </a:lnSpc>
@@ -2837,7 +2817,7 @@
           <a:cs typeface="+mn-cs"/>
         </a:defRPr>
       </a:lvl8pPr>
-      <a:lvl9pPr marL="3886200" indent="-228600" algn="l" defTabSz="914400" rtl="0" eaLnBrk="1" latinLnBrk="0" hangingPunct="1">
+      <a:lvl9pPr marL="3886248" indent="-228603" algn="l" defTabSz="914411" rtl="0" eaLnBrk="1" latinLnBrk="0" hangingPunct="1">
         <a:lnSpc>
           <a:spcPct val="90000"/>
         </a:lnSpc>
@@ -2860,7 +2840,7 @@
       <a:defPPr>
         <a:defRPr lang="en-US"/>
       </a:defPPr>
-      <a:lvl1pPr marL="0" algn="l" defTabSz="914400" rtl="0" eaLnBrk="1" latinLnBrk="0" hangingPunct="1">
+      <a:lvl1pPr marL="0" algn="l" defTabSz="914411" rtl="0" eaLnBrk="1" latinLnBrk="0" hangingPunct="1">
         <a:defRPr sz="1800" kern="1200">
           <a:solidFill>
             <a:schemeClr val="tx1"/>
@@ -2870,7 +2850,7 @@
           <a:cs typeface="+mn-cs"/>
         </a:defRPr>
       </a:lvl1pPr>
-      <a:lvl2pPr marL="457200" algn="l" defTabSz="914400" rtl="0" eaLnBrk="1" latinLnBrk="0" hangingPunct="1">
+      <a:lvl2pPr marL="457206" algn="l" defTabSz="914411" rtl="0" eaLnBrk="1" latinLnBrk="0" hangingPunct="1">
         <a:defRPr sz="1800" kern="1200">
           <a:solidFill>
             <a:schemeClr val="tx1"/>
@@ -2880,7 +2860,7 @@
           <a:cs typeface="+mn-cs"/>
         </a:defRPr>
       </a:lvl2pPr>
-      <a:lvl3pPr marL="914400" algn="l" defTabSz="914400" rtl="0" eaLnBrk="1" latinLnBrk="0" hangingPunct="1">
+      <a:lvl3pPr marL="914411" algn="l" defTabSz="914411" rtl="0" eaLnBrk="1" latinLnBrk="0" hangingPunct="1">
         <a:defRPr sz="1800" kern="1200">
           <a:solidFill>
             <a:schemeClr val="tx1"/>
@@ -2890,7 +2870,7 @@
           <a:cs typeface="+mn-cs"/>
         </a:defRPr>
       </a:lvl3pPr>
-      <a:lvl4pPr marL="1371600" algn="l" defTabSz="914400" rtl="0" eaLnBrk="1" latinLnBrk="0" hangingPunct="1">
+      <a:lvl4pPr marL="1371617" algn="l" defTabSz="914411" rtl="0" eaLnBrk="1" latinLnBrk="0" hangingPunct="1">
         <a:defRPr sz="1800" kern="1200">
           <a:solidFill>
             <a:schemeClr val="tx1"/>
@@ -2900,7 +2880,7 @@
           <a:cs typeface="+mn-cs"/>
         </a:defRPr>
       </a:lvl4pPr>
-      <a:lvl5pPr marL="1828800" algn="l" defTabSz="914400" rtl="0" eaLnBrk="1" latinLnBrk="0" hangingPunct="1">
+      <a:lvl5pPr marL="1828823" algn="l" defTabSz="914411" rtl="0" eaLnBrk="1" latinLnBrk="0" hangingPunct="1">
         <a:defRPr sz="1800" kern="1200">
           <a:solidFill>
             <a:schemeClr val="tx1"/>
@@ -2910,7 +2890,7 @@
           <a:cs typeface="+mn-cs"/>
         </a:defRPr>
       </a:lvl5pPr>
-      <a:lvl6pPr marL="2286000" algn="l" defTabSz="914400" rtl="0" eaLnBrk="1" latinLnBrk="0" hangingPunct="1">
+      <a:lvl6pPr marL="2286029" algn="l" defTabSz="914411" rtl="0" eaLnBrk="1" latinLnBrk="0" hangingPunct="1">
         <a:defRPr sz="1800" kern="1200">
           <a:solidFill>
             <a:schemeClr val="tx1"/>
@@ -2920,7 +2900,7 @@
           <a:cs typeface="+mn-cs"/>
         </a:defRPr>
       </a:lvl6pPr>
-      <a:lvl7pPr marL="2743200" algn="l" defTabSz="914400" rtl="0" eaLnBrk="1" latinLnBrk="0" hangingPunct="1">
+      <a:lvl7pPr marL="2743234" algn="l" defTabSz="914411" rtl="0" eaLnBrk="1" latinLnBrk="0" hangingPunct="1">
         <a:defRPr sz="1800" kern="1200">
           <a:solidFill>
             <a:schemeClr val="tx1"/>
@@ -2930,7 +2910,7 @@
           <a:cs typeface="+mn-cs"/>
         </a:defRPr>
       </a:lvl7pPr>
-      <a:lvl8pPr marL="3200400" algn="l" defTabSz="914400" rtl="0" eaLnBrk="1" latinLnBrk="0" hangingPunct="1">
+      <a:lvl8pPr marL="3200440" algn="l" defTabSz="914411" rtl="0" eaLnBrk="1" latinLnBrk="0" hangingPunct="1">
         <a:defRPr sz="1800" kern="1200">
           <a:solidFill>
             <a:schemeClr val="tx1"/>
@@ -2940,7 +2920,7 @@
           <a:cs typeface="+mn-cs"/>
         </a:defRPr>
       </a:lvl8pPr>
-      <a:lvl9pPr marL="3657600" algn="l" defTabSz="914400" rtl="0" eaLnBrk="1" latinLnBrk="0" hangingPunct="1">
+      <a:lvl9pPr marL="3657646" algn="l" defTabSz="914411" rtl="0" eaLnBrk="1" latinLnBrk="0" hangingPunct="1">
         <a:defRPr sz="1800" kern="1200">
           <a:solidFill>
             <a:schemeClr val="tx1"/>
@@ -3001,10 +2981,9 @@
           <a:p>
             <a:pPr algn="ctr"/>
             <a:r>
-              <a:rPr lang="en-US" dirty="0" smtClean="0"/>
+              <a:rPr lang="en-US" dirty="0"/>
               <a:t>Conv-1-1</a:t>
             </a:r>
-            <a:endParaRPr lang="en-US" dirty="0"/>
           </a:p>
         </p:txBody>
       </p:sp>
@@ -3037,10 +3016,9 @@
           <a:p>
             <a:pPr algn="ctr"/>
             <a:r>
-              <a:rPr lang="en-US" dirty="0" smtClean="0"/>
+              <a:rPr lang="en-US" dirty="0"/>
               <a:t>Conv-1-2</a:t>
             </a:r>
-            <a:endParaRPr lang="en-US" dirty="0"/>
           </a:p>
         </p:txBody>
       </p:sp>
@@ -3073,10 +3051,9 @@
           <a:p>
             <a:pPr algn="ctr"/>
             <a:r>
-              <a:rPr lang="en-US" dirty="0" smtClean="0"/>
+              <a:rPr lang="en-US" dirty="0"/>
               <a:t>Max Pooling</a:t>
             </a:r>
-            <a:endParaRPr lang="en-US" dirty="0"/>
           </a:p>
         </p:txBody>
       </p:sp>
@@ -3109,10 +3086,9 @@
           <a:p>
             <a:pPr algn="ctr"/>
             <a:r>
-              <a:rPr lang="en-US" dirty="0" smtClean="0"/>
+              <a:rPr lang="en-US" dirty="0"/>
               <a:t>Conv-2-1</a:t>
             </a:r>
-            <a:endParaRPr lang="en-US" dirty="0"/>
           </a:p>
         </p:txBody>
       </p:sp>
@@ -3145,10 +3121,9 @@
           <a:p>
             <a:pPr algn="ctr"/>
             <a:r>
-              <a:rPr lang="en-US" dirty="0" smtClean="0"/>
+              <a:rPr lang="en-US" dirty="0"/>
               <a:t>Conv-2-2</a:t>
             </a:r>
-            <a:endParaRPr lang="en-US" dirty="0"/>
           </a:p>
         </p:txBody>
       </p:sp>
@@ -3181,10 +3156,9 @@
           <a:p>
             <a:pPr algn="ctr"/>
             <a:r>
-              <a:rPr lang="en-US" dirty="0" smtClean="0"/>
+              <a:rPr lang="en-US" dirty="0"/>
               <a:t>Max Pooling</a:t>
             </a:r>
-            <a:endParaRPr lang="en-US" dirty="0"/>
           </a:p>
         </p:txBody>
       </p:sp>
@@ -3212,10 +3186,9 @@
           <a:p>
             <a:pPr algn="ctr"/>
             <a:r>
-              <a:rPr lang="en-US" dirty="0" smtClean="0"/>
+              <a:rPr lang="en-US" dirty="0"/>
               <a:t>INPUT</a:t>
             </a:r>
-            <a:endParaRPr lang="en-US" dirty="0"/>
           </a:p>
         </p:txBody>
       </p:sp>
@@ -3243,10 +3216,9 @@
           <a:p>
             <a:pPr algn="ctr"/>
             <a:r>
-              <a:rPr lang="en-US" dirty="0" smtClean="0"/>
+              <a:rPr lang="en-US" dirty="0"/>
               <a:t>OUTPUT</a:t>
             </a:r>
-            <a:endParaRPr lang="en-US" dirty="0"/>
           </a:p>
         </p:txBody>
       </p:sp>
@@ -3279,10 +3251,9 @@
           <a:p>
             <a:pPr algn="ctr"/>
             <a:r>
-              <a:rPr lang="en-US" dirty="0" smtClean="0"/>
+              <a:rPr lang="en-US" dirty="0"/>
               <a:t>Dense</a:t>
             </a:r>
-            <a:endParaRPr lang="en-US" dirty="0"/>
           </a:p>
         </p:txBody>
       </p:sp>
@@ -3315,10 +3286,9 @@
           <a:p>
             <a:pPr algn="ctr"/>
             <a:r>
-              <a:rPr lang="en-US" dirty="0" smtClean="0"/>
+              <a:rPr lang="en-US" dirty="0"/>
               <a:t>Batchnorm</a:t>
             </a:r>
-            <a:endParaRPr lang="en-US" dirty="0"/>
           </a:p>
         </p:txBody>
       </p:sp>
@@ -3351,10 +3321,9 @@
           <a:p>
             <a:pPr algn="ctr"/>
             <a:r>
-              <a:rPr lang="en-US" dirty="0" smtClean="0"/>
+              <a:rPr lang="en-US" dirty="0"/>
               <a:t>Batchnorm</a:t>
             </a:r>
-            <a:endParaRPr lang="en-US" dirty="0"/>
           </a:p>
         </p:txBody>
       </p:sp>
@@ -3366,7 +3335,7 @@
         </p:nvSpPr>
         <p:spPr>
           <a:xfrm rot="16200000">
-            <a:off x="5848445" y="1828800"/>
+            <a:off x="5848445" y="1828801"/>
             <a:ext cx="2286000" cy="369332"/>
           </a:xfrm>
           <a:prstGeom prst="rect">
@@ -3387,10 +3356,9 @@
           <a:p>
             <a:pPr algn="ctr"/>
             <a:r>
-              <a:rPr lang="en-US" dirty="0" smtClean="0"/>
+              <a:rPr lang="en-US" dirty="0"/>
               <a:t>Conv-4-1</a:t>
             </a:r>
-            <a:endParaRPr lang="en-US" dirty="0"/>
           </a:p>
         </p:txBody>
       </p:sp>
@@ -3402,7 +3370,7 @@
         </p:nvSpPr>
         <p:spPr>
           <a:xfrm rot="16200000">
-            <a:off x="6224523" y="1828800"/>
+            <a:off x="6224523" y="1828801"/>
             <a:ext cx="2286000" cy="369332"/>
           </a:xfrm>
           <a:prstGeom prst="rect">
@@ -3423,10 +3391,9 @@
           <a:p>
             <a:pPr algn="ctr"/>
             <a:r>
-              <a:rPr lang="en-US" dirty="0" smtClean="0"/>
+              <a:rPr lang="en-US" dirty="0"/>
               <a:t>Conv-4-2</a:t>
             </a:r>
-            <a:endParaRPr lang="en-US" dirty="0"/>
           </a:p>
         </p:txBody>
       </p:sp>
@@ -3438,7 +3405,7 @@
         </p:nvSpPr>
         <p:spPr>
           <a:xfrm rot="16200000">
-            <a:off x="6963187" y="1828800"/>
+            <a:off x="6963187" y="1828801"/>
             <a:ext cx="2286000" cy="369332"/>
           </a:xfrm>
           <a:prstGeom prst="rect">
@@ -3459,10 +3426,9 @@
           <a:p>
             <a:pPr algn="ctr"/>
             <a:r>
-              <a:rPr lang="en-US" dirty="0" smtClean="0"/>
+              <a:rPr lang="en-US" dirty="0"/>
               <a:t>Max Pooling</a:t>
             </a:r>
-            <a:endParaRPr lang="en-US" dirty="0"/>
           </a:p>
         </p:txBody>
       </p:sp>
@@ -3474,7 +3440,7 @@
         </p:nvSpPr>
         <p:spPr>
           <a:xfrm rot="16200000">
-            <a:off x="6589481" y="1828800"/>
+            <a:off x="6589481" y="1828801"/>
             <a:ext cx="2286000" cy="369332"/>
           </a:xfrm>
           <a:prstGeom prst="rect">
@@ -3495,10 +3461,9 @@
           <a:p>
             <a:pPr algn="ctr"/>
             <a:r>
-              <a:rPr lang="en-US" dirty="0" smtClean="0"/>
+              <a:rPr lang="en-US" dirty="0"/>
               <a:t>Batchnorm</a:t>
             </a:r>
-            <a:endParaRPr lang="en-US" dirty="0"/>
           </a:p>
         </p:txBody>
       </p:sp>
@@ -3510,7 +3475,7 @@
         </p:nvSpPr>
         <p:spPr>
           <a:xfrm rot="16200000">
-            <a:off x="7603591" y="1828800"/>
+            <a:off x="11770779" y="1828801"/>
             <a:ext cx="2286000" cy="369332"/>
           </a:xfrm>
           <a:prstGeom prst="rect">
@@ -3531,10 +3496,9 @@
           <a:p>
             <a:pPr algn="ctr"/>
             <a:r>
-              <a:rPr lang="en-US" dirty="0" smtClean="0"/>
+              <a:rPr lang="en-US" dirty="0"/>
               <a:t>Conv-5-1</a:t>
             </a:r>
-            <a:endParaRPr lang="en-US" dirty="0"/>
           </a:p>
         </p:txBody>
       </p:sp>
@@ -3567,10 +3531,9 @@
           <a:p>
             <a:pPr algn="ctr"/>
             <a:r>
-              <a:rPr lang="en-US" dirty="0" smtClean="0"/>
+              <a:rPr lang="en-US" dirty="0"/>
               <a:t>Max Pooling</a:t>
             </a:r>
-            <a:endParaRPr lang="en-US" dirty="0"/>
           </a:p>
         </p:txBody>
       </p:sp>
@@ -3582,7 +3545,7 @@
         </p:nvSpPr>
         <p:spPr>
           <a:xfrm rot="16200000">
-            <a:off x="7970736" y="1828800"/>
+            <a:off x="12137924" y="1828801"/>
             <a:ext cx="2286000" cy="369332"/>
           </a:xfrm>
           <a:prstGeom prst="rect">
@@ -3603,10 +3566,9 @@
           <a:p>
             <a:pPr algn="ctr"/>
             <a:r>
-              <a:rPr lang="en-US" dirty="0" smtClean="0"/>
+              <a:rPr lang="en-US" dirty="0"/>
               <a:t>Batchnorm</a:t>
             </a:r>
-            <a:endParaRPr lang="en-US" dirty="0"/>
           </a:p>
         </p:txBody>
       </p:sp>
@@ -3639,10 +3601,9 @@
           <a:p>
             <a:pPr algn="ctr"/>
             <a:r>
-              <a:rPr lang="en-US" dirty="0" smtClean="0"/>
+              <a:rPr lang="en-US" dirty="0"/>
               <a:t>Conv-3-1</a:t>
             </a:r>
-            <a:endParaRPr lang="en-US" dirty="0"/>
           </a:p>
         </p:txBody>
       </p:sp>
@@ -3654,7 +3615,7 @@
         </p:nvSpPr>
         <p:spPr>
           <a:xfrm rot="16200000">
-            <a:off x="4452785" y="1828800"/>
+            <a:off x="4452785" y="1828801"/>
             <a:ext cx="2286000" cy="369332"/>
           </a:xfrm>
           <a:prstGeom prst="rect">
@@ -3675,10 +3636,9 @@
           <a:p>
             <a:pPr algn="ctr"/>
             <a:r>
-              <a:rPr lang="en-US" dirty="0" smtClean="0"/>
+              <a:rPr lang="en-US" dirty="0"/>
               <a:t>Conv-3-2</a:t>
             </a:r>
-            <a:endParaRPr lang="en-US" dirty="0"/>
           </a:p>
         </p:txBody>
       </p:sp>
@@ -3690,7 +3650,7 @@
         </p:nvSpPr>
         <p:spPr>
           <a:xfrm rot="16200000">
-            <a:off x="5191449" y="1828800"/>
+            <a:off x="5191449" y="1828801"/>
             <a:ext cx="2286000" cy="369332"/>
           </a:xfrm>
           <a:prstGeom prst="rect">
@@ -3711,10 +3671,9 @@
           <a:p>
             <a:pPr algn="ctr"/>
             <a:r>
-              <a:rPr lang="en-US" dirty="0" smtClean="0"/>
+              <a:rPr lang="en-US" dirty="0"/>
               <a:t>Max Pooling</a:t>
             </a:r>
-            <a:endParaRPr lang="en-US" dirty="0"/>
           </a:p>
         </p:txBody>
       </p:sp>
@@ -3726,7 +3685,7 @@
         </p:nvSpPr>
         <p:spPr>
           <a:xfrm rot="16200000">
-            <a:off x="4817743" y="1828800"/>
+            <a:off x="4817743" y="1828801"/>
             <a:ext cx="2286000" cy="369332"/>
           </a:xfrm>
           <a:prstGeom prst="rect">
@@ -3747,10 +3706,9 @@
           <a:p>
             <a:pPr algn="ctr"/>
             <a:r>
-              <a:rPr lang="en-US" dirty="0" smtClean="0"/>
+              <a:rPr lang="en-US" dirty="0"/>
               <a:t>Batchnorm</a:t>
             </a:r>
-            <a:endParaRPr lang="en-US" dirty="0"/>
           </a:p>
         </p:txBody>
       </p:sp>
@@ -3783,10 +3741,9 @@
           <a:p>
             <a:pPr algn="ctr"/>
             <a:r>
-              <a:rPr lang="en-US" dirty="0" smtClean="0"/>
+              <a:rPr lang="en-US" dirty="0"/>
               <a:t>Dense</a:t>
             </a:r>
-            <a:endParaRPr lang="en-US" dirty="0"/>
           </a:p>
         </p:txBody>
       </p:sp>
@@ -3972,10 +3929,9 @@
           <a:p>
             <a:pPr algn="ctr"/>
             <a:r>
-              <a:rPr lang="en-US" dirty="0" smtClean="0"/>
+              <a:rPr lang="en-US" dirty="0"/>
               <a:t>INPUT</a:t>
             </a:r>
-            <a:endParaRPr lang="en-US" dirty="0"/>
           </a:p>
         </p:txBody>
       </p:sp>
@@ -4204,10 +4160,9 @@
           <a:p>
             <a:pPr algn="ctr"/>
             <a:r>
-              <a:rPr lang="en-US" dirty="0" smtClean="0"/>
+              <a:rPr lang="en-US" dirty="0"/>
               <a:t>OUTPUT</a:t>
             </a:r>
-            <a:endParaRPr lang="en-US" dirty="0"/>
           </a:p>
         </p:txBody>
       </p:sp>
@@ -4280,10 +4235,9 @@
           <a:p>
             <a:pPr algn="ctr"/>
             <a:r>
-              <a:rPr lang="en-US" dirty="0" smtClean="0"/>
+              <a:rPr lang="en-US" dirty="0"/>
               <a:t>abs(v1-v2)</a:t>
             </a:r>
-            <a:endParaRPr lang="en-US" dirty="0"/>
           </a:p>
         </p:txBody>
       </p:sp>
@@ -4394,10 +4348,9 @@
           <a:p>
             <a:pPr algn="ctr"/>
             <a:r>
-              <a:rPr lang="en-US" dirty="0" smtClean="0"/>
+              <a:rPr lang="en-US" dirty="0"/>
               <a:t>[‘hello’, ‘darling’]</a:t>
             </a:r>
-            <a:endParaRPr lang="en-US" dirty="0"/>
           </a:p>
         </p:txBody>
       </p:sp>
@@ -4424,10 +4377,9 @@
           <a:lstStyle/>
           <a:p>
             <a:r>
-              <a:rPr lang="en-US" dirty="0" smtClean="0"/>
+              <a:rPr lang="en-US" dirty="0"/>
               <a:t>First two words of song</a:t>
             </a:r>
-            <a:endParaRPr lang="en-US" dirty="0"/>
           </a:p>
         </p:txBody>
       </p:sp>
@@ -4494,10 +4446,9 @@
           <a:lstStyle/>
           <a:p>
             <a:r>
-              <a:rPr lang="en-US" dirty="0" smtClean="0"/>
+              <a:rPr lang="en-US" dirty="0"/>
               <a:t>tokenizing</a:t>
             </a:r>
-            <a:endParaRPr lang="en-US" dirty="0"/>
           </a:p>
         </p:txBody>
       </p:sp>
@@ -4538,10 +4489,9 @@
           <a:p>
             <a:pPr algn="ctr"/>
             <a:r>
-              <a:rPr lang="en-US" dirty="0" smtClean="0"/>
+              <a:rPr lang="en-US" dirty="0"/>
               <a:t>[134, 2375]</a:t>
             </a:r>
-            <a:endParaRPr lang="en-US" dirty="0"/>
           </a:p>
         </p:txBody>
       </p:sp>
@@ -4593,8 +4543,8 @@
         </p:nvSpPr>
         <p:spPr>
           <a:xfrm>
-            <a:off x="5421973" y="3523399"/>
-            <a:ext cx="1386470" cy="646331"/>
+            <a:off x="5421973" y="3523400"/>
+            <a:ext cx="1389676" cy="646331"/>
           </a:xfrm>
           <a:prstGeom prst="rect">
             <a:avLst/>
@@ -4608,24 +4558,23 @@
           <a:lstStyle/>
           <a:p>
             <a:r>
-              <a:rPr lang="en-US" dirty="0" smtClean="0"/>
+              <a:rPr lang="en-US" dirty="0"/>
               <a:t>pre-padding,</a:t>
             </a:r>
           </a:p>
           <a:p>
             <a:r>
-              <a:rPr lang="en-US" dirty="0" smtClean="0"/>
+              <a:rPr lang="en-US" dirty="0"/>
               <a:t>max-</a:t>
             </a:r>
             <a:r>
-              <a:rPr lang="en-US" dirty="0" err="1" smtClean="0"/>
+              <a:rPr lang="en-US" dirty="0" err="1"/>
               <a:t>len</a:t>
             </a:r>
             <a:r>
-              <a:rPr lang="en-US" dirty="0" smtClean="0"/>
+              <a:rPr lang="en-US" dirty="0"/>
               <a:t> = 5</a:t>
             </a:r>
-            <a:endParaRPr lang="en-US" dirty="0"/>
           </a:p>
         </p:txBody>
       </p:sp>
@@ -4637,7 +4586,7 @@
         </p:nvSpPr>
         <p:spPr>
           <a:xfrm>
-            <a:off x="6558442" y="2984863"/>
+            <a:off x="6558443" y="2984864"/>
             <a:ext cx="2207623" cy="418011"/>
           </a:xfrm>
           <a:prstGeom prst="rect">
@@ -4666,10 +4615,9 @@
           <a:p>
             <a:pPr algn="ctr"/>
             <a:r>
-              <a:rPr lang="en-US" dirty="0" smtClean="0"/>
+              <a:rPr lang="en-US" dirty="0"/>
               <a:t>[0,0,0,134, 2375]</a:t>
             </a:r>
-            <a:endParaRPr lang="en-US" dirty="0"/>
           </a:p>
         </p:txBody>
       </p:sp>
@@ -4790,10 +4738,9 @@
           <a:p>
             <a:pPr algn="ctr"/>
             <a:r>
-              <a:rPr lang="en-US" dirty="0" smtClean="0"/>
+              <a:rPr lang="en-US" dirty="0"/>
               <a:t>[0,0,0,134]</a:t>
             </a:r>
-            <a:endParaRPr lang="en-US" dirty="0"/>
           </a:p>
         </p:txBody>
       </p:sp>
@@ -4834,18 +4781,9 @@
           <a:p>
             <a:pPr algn="ctr"/>
             <a:r>
-              <a:rPr lang="en-US" dirty="0" smtClean="0"/>
-              <a:t>[</a:t>
-            </a:r>
-            <a:r>
               <a:rPr lang="en-US" dirty="0"/>
-              <a:t>2375</a:t>
-            </a:r>
-            <a:r>
-              <a:rPr lang="en-US" dirty="0" smtClean="0"/>
-              <a:t>]</a:t>
-            </a:r>
-            <a:endParaRPr lang="en-US" dirty="0"/>
+              <a:t>[2375]</a:t>
+            </a:r>
           </a:p>
         </p:txBody>
       </p:sp>
@@ -4872,10 +4810,9 @@
           <a:lstStyle/>
           <a:p>
             <a:r>
-              <a:rPr lang="en-US" dirty="0" smtClean="0"/>
+              <a:rPr lang="en-US" dirty="0"/>
               <a:t>X</a:t>
             </a:r>
-            <a:endParaRPr lang="en-US" dirty="0"/>
           </a:p>
         </p:txBody>
       </p:sp>
@@ -4902,10 +4839,9 @@
           <a:lstStyle/>
           <a:p>
             <a:r>
-              <a:rPr lang="en-US" dirty="0" smtClean="0"/>
+              <a:rPr lang="en-US" dirty="0"/>
               <a:t>y</a:t>
             </a:r>
-            <a:endParaRPr lang="en-US" dirty="0"/>
           </a:p>
         </p:txBody>
       </p:sp>
@@ -5006,10 +4942,9 @@
           <a:p>
             <a:pPr algn="ctr"/>
             <a:r>
-              <a:rPr lang="en-US" dirty="0" smtClean="0"/>
+              <a:rPr lang="en-US" dirty="0"/>
               <a:t>Embedding</a:t>
             </a:r>
-            <a:endParaRPr lang="en-US" dirty="0"/>
           </a:p>
         </p:txBody>
       </p:sp>
@@ -5042,10 +4977,9 @@
           <a:p>
             <a:pPr algn="ctr"/>
             <a:r>
-              <a:rPr lang="en-US" dirty="0" smtClean="0"/>
+              <a:rPr lang="en-US" dirty="0"/>
               <a:t>LSTM</a:t>
             </a:r>
-            <a:endParaRPr lang="en-US" dirty="0"/>
           </a:p>
         </p:txBody>
       </p:sp>
@@ -5073,10 +5007,9 @@
           <a:p>
             <a:pPr algn="ctr"/>
             <a:r>
-              <a:rPr lang="en-US" dirty="0" smtClean="0"/>
+              <a:rPr lang="en-US" dirty="0"/>
               <a:t>Lyrics n-gram sequence</a:t>
             </a:r>
-            <a:endParaRPr lang="en-US" dirty="0"/>
           </a:p>
         </p:txBody>
       </p:sp>
@@ -5109,10 +5042,9 @@
           <a:p>
             <a:pPr algn="ctr"/>
             <a:r>
-              <a:rPr lang="en-US" dirty="0" smtClean="0"/>
+              <a:rPr lang="en-US" dirty="0"/>
               <a:t>Batchnorm</a:t>
             </a:r>
-            <a:endParaRPr lang="en-US" dirty="0"/>
           </a:p>
         </p:txBody>
       </p:sp>
@@ -5257,10 +5189,9 @@
           <a:p>
             <a:pPr algn="ctr"/>
             <a:r>
-              <a:rPr lang="en-US" dirty="0" smtClean="0"/>
+              <a:rPr lang="en-US" dirty="0"/>
               <a:t>Emb.</a:t>
             </a:r>
-            <a:endParaRPr lang="en-US" dirty="0"/>
           </a:p>
         </p:txBody>
       </p:sp>
@@ -5293,10 +5224,9 @@
           <a:p>
             <a:pPr algn="ctr"/>
             <a:r>
-              <a:rPr lang="en-US" sz="1600" dirty="0" smtClean="0"/>
+              <a:rPr lang="en-US" sz="1600" dirty="0"/>
               <a:t>LSTM</a:t>
             </a:r>
-            <a:endParaRPr lang="en-US" sz="1600" dirty="0"/>
           </a:p>
         </p:txBody>
       </p:sp>
@@ -5347,7 +5277,7 @@
         <p:spPr>
           <a:xfrm>
             <a:off x="3051038" y="2917188"/>
-            <a:ext cx="0" cy="160898"/>
+            <a:ext cx="1" cy="160898"/>
           </a:xfrm>
           <a:prstGeom prst="straightConnector1">
             <a:avLst/>
@@ -5382,7 +5312,7 @@
         <p:spPr>
           <a:xfrm>
             <a:off x="3235704" y="1397132"/>
-            <a:ext cx="199827" cy="0"/>
+            <a:ext cx="199827" cy="1"/>
           </a:xfrm>
           <a:prstGeom prst="straightConnector1">
             <a:avLst/>
@@ -5417,7 +5347,7 @@
         <p:spPr>
           <a:xfrm>
             <a:off x="3220315" y="2589578"/>
-            <a:ext cx="215216" cy="0"/>
+            <a:ext cx="215216" cy="1"/>
           </a:xfrm>
           <a:prstGeom prst="straightConnector1">
             <a:avLst/>
@@ -5464,10 +5394,9 @@
           <a:lstStyle/>
           <a:p>
             <a:r>
-              <a:rPr lang="en-US" dirty="0" smtClean="0"/>
+              <a:rPr lang="en-US" dirty="0"/>
               <a:t>…</a:t>
             </a:r>
-            <a:endParaRPr lang="en-US" dirty="0"/>
           </a:p>
         </p:txBody>
       </p:sp>
@@ -5535,10 +5464,9 @@
           <a:p>
             <a:pPr algn="ctr"/>
             <a:r>
-              <a:rPr lang="en-US" dirty="0" smtClean="0"/>
+              <a:rPr lang="en-US" dirty="0"/>
               <a:t>Emb.</a:t>
             </a:r>
-            <a:endParaRPr lang="en-US" dirty="0"/>
           </a:p>
         </p:txBody>
       </p:sp>
@@ -5571,10 +5499,9 @@
           <a:p>
             <a:pPr algn="ctr"/>
             <a:r>
-              <a:rPr lang="en-US" sz="1600" dirty="0" smtClean="0"/>
+              <a:rPr lang="en-US" sz="1600" dirty="0"/>
               <a:t>LSTM</a:t>
             </a:r>
-            <a:endParaRPr lang="en-US" sz="1600" dirty="0"/>
           </a:p>
         </p:txBody>
       </p:sp>
@@ -5625,7 +5552,7 @@
         <p:spPr>
           <a:xfrm>
             <a:off x="3216493" y="3900018"/>
-            <a:ext cx="1092996" cy="0"/>
+            <a:ext cx="1092996" cy="1"/>
           </a:xfrm>
           <a:prstGeom prst="straightConnector1">
             <a:avLst/>
@@ -5678,10 +5605,9 @@
           <a:p>
             <a:pPr algn="ctr"/>
             <a:r>
-              <a:rPr lang="en-US" dirty="0" smtClean="0"/>
+              <a:rPr lang="en-US" dirty="0"/>
               <a:t>Dense</a:t>
             </a:r>
-            <a:endParaRPr lang="en-US" dirty="0"/>
           </a:p>
         </p:txBody>
       </p:sp>
@@ -5723,10 +5649,9 @@
           <a:p>
             <a:pPr algn="ctr"/>
             <a:r>
-              <a:rPr lang="en-US" dirty="0" smtClean="0"/>
+              <a:rPr lang="en-US" dirty="0"/>
               <a:t>Dropout (0.3)</a:t>
             </a:r>
-            <a:endParaRPr lang="en-US" dirty="0"/>
           </a:p>
         </p:txBody>
       </p:sp>
@@ -5754,10 +5679,9 @@
           <a:p>
             <a:pPr algn="ctr"/>
             <a:r>
-              <a:rPr lang="en-US" dirty="0" smtClean="0"/>
+              <a:rPr lang="en-US" dirty="0"/>
               <a:t>MIDI meta-data</a:t>
             </a:r>
-            <a:endParaRPr lang="en-US" dirty="0"/>
           </a:p>
         </p:txBody>
       </p:sp>
@@ -5830,10 +5754,9 @@
           <a:p>
             <a:pPr algn="ctr"/>
             <a:r>
-              <a:rPr lang="en-US" dirty="0" smtClean="0"/>
+              <a:rPr lang="en-US" dirty="0"/>
               <a:t>Dense</a:t>
             </a:r>
-            <a:endParaRPr lang="en-US" dirty="0"/>
           </a:p>
         </p:txBody>
       </p:sp>
@@ -5938,10 +5861,9 @@
           <a:p>
             <a:pPr algn="ctr"/>
             <a:r>
-              <a:rPr lang="en-US" dirty="0" smtClean="0"/>
+              <a:rPr lang="en-US" dirty="0"/>
               <a:t>Batchnorm</a:t>
             </a:r>
-            <a:endParaRPr lang="en-US" dirty="0"/>
           </a:p>
         </p:txBody>
       </p:sp>
@@ -5989,7 +5911,7 @@
         </p:nvSpPr>
         <p:spPr>
           <a:xfrm rot="16200000">
-            <a:off x="5814665" y="4234244"/>
+            <a:off x="5814665" y="4234245"/>
             <a:ext cx="2286000" cy="369332"/>
           </a:xfrm>
           <a:prstGeom prst="rect">
@@ -6010,10 +5932,9 @@
           <a:p>
             <a:pPr algn="ctr"/>
             <a:r>
-              <a:rPr lang="en-US" dirty="0" smtClean="0"/>
+              <a:rPr lang="en-US" dirty="0"/>
               <a:t>Dense</a:t>
             </a:r>
-            <a:endParaRPr lang="en-US" dirty="0"/>
           </a:p>
         </p:txBody>
       </p:sp>
@@ -6065,7 +5986,7 @@
         </p:nvSpPr>
         <p:spPr>
           <a:xfrm rot="19195509">
-            <a:off x="4910493" y="5096714"/>
+            <a:off x="4910494" y="5096714"/>
             <a:ext cx="727789" cy="334880"/>
           </a:xfrm>
           <a:prstGeom prst="rightArrow">
@@ -6135,10 +6056,9 @@
           <a:p>
             <a:pPr algn="ctr"/>
             <a:r>
-              <a:rPr lang="en-US" dirty="0" smtClean="0"/>
+              <a:rPr lang="en-US" dirty="0"/>
               <a:t>Concatenate layer</a:t>
             </a:r>
-            <a:endParaRPr lang="en-US" dirty="0"/>
           </a:p>
         </p:txBody>
       </p:sp>
@@ -6152,9 +6072,9 @@
           <p:nvPr/>
         </p:nvCxnSpPr>
         <p:spPr>
-          <a:xfrm flipV="1">
-            <a:off x="6269170" y="4418910"/>
-            <a:ext cx="503829" cy="1"/>
+          <a:xfrm>
+            <a:off x="6269170" y="4418911"/>
+            <a:ext cx="503829" cy="0"/>
           </a:xfrm>
           <a:prstGeom prst="straightConnector1">
             <a:avLst/>
@@ -6186,7 +6106,7 @@
         </p:nvSpPr>
         <p:spPr>
           <a:xfrm rot="16200000">
-            <a:off x="6781966" y="4255089"/>
+            <a:off x="6781966" y="4255090"/>
             <a:ext cx="2565094" cy="369332"/>
           </a:xfrm>
           <a:prstGeom prst="rect">
@@ -6202,10 +6122,9 @@
           <a:p>
             <a:pPr algn="ctr"/>
             <a:r>
-              <a:rPr lang="en-US" dirty="0" smtClean="0"/>
+              <a:rPr lang="en-US" dirty="0"/>
               <a:t>OUTPUT</a:t>
             </a:r>
-            <a:endParaRPr lang="en-US" dirty="0"/>
           </a:p>
         </p:txBody>
       </p:sp>
@@ -6253,6 +6172,1199 @@
     <p:extLst>
       <p:ext uri="{BB962C8B-B14F-4D97-AF65-F5344CB8AC3E}">
         <p14:creationId xmlns:p14="http://schemas.microsoft.com/office/powerpoint/2010/main" val="1382313254"/>
+      </p:ext>
+    </p:extLst>
+  </p:cSld>
+  <p:clrMapOvr>
+    <a:masterClrMapping/>
+  </p:clrMapOvr>
+</p:sld>
+</file>
+
+<file path=ppt/slides/slide5.xml><?xml version="1.0" encoding="utf-8"?>
+<p:sld xmlns:a="http://schemas.openxmlformats.org/drawingml/2006/main" xmlns:r="http://schemas.openxmlformats.org/officeDocument/2006/relationships" xmlns:p="http://schemas.openxmlformats.org/presentationml/2006/main">
+  <p:cSld>
+    <p:spTree>
+      <p:nvGrpSpPr>
+        <p:cNvPr id="1" name=""/>
+        <p:cNvGrpSpPr/>
+        <p:nvPr/>
+      </p:nvGrpSpPr>
+      <p:grpSpPr>
+        <a:xfrm>
+          <a:off x="0" y="0"/>
+          <a:ext cx="0" cy="0"/>
+          <a:chOff x="0" y="0"/>
+          <a:chExt cx="0" cy="0"/>
+        </a:xfrm>
+      </p:grpSpPr>
+      <p:sp>
+        <p:nvSpPr>
+          <p:cNvPr id="55" name="Rectangle 54"/>
+          <p:cNvSpPr/>
+          <p:nvPr/>
+        </p:nvSpPr>
+        <p:spPr>
+          <a:xfrm>
+            <a:off x="4532277" y="1872485"/>
+            <a:ext cx="1618072" cy="3721140"/>
+          </a:xfrm>
+          <a:prstGeom prst="rect">
+            <a:avLst/>
+          </a:prstGeom>
+        </p:spPr>
+        <p:style>
+          <a:lnRef idx="2">
+            <a:schemeClr val="dk1"/>
+          </a:lnRef>
+          <a:fillRef idx="1">
+            <a:schemeClr val="lt1"/>
+          </a:fillRef>
+          <a:effectRef idx="0">
+            <a:schemeClr val="dk1"/>
+          </a:effectRef>
+          <a:fontRef idx="minor">
+            <a:schemeClr val="dk1"/>
+          </a:fontRef>
+        </p:style>
+        <p:txBody>
+          <a:bodyPr rtlCol="0" anchor="ctr"/>
+          <a:lstStyle/>
+          <a:p>
+            <a:pPr algn="ctr"/>
+            <a:endParaRPr lang="en-US"/>
+          </a:p>
+        </p:txBody>
+      </p:sp>
+      <p:sp>
+        <p:nvSpPr>
+          <p:cNvPr id="4" name="TextBox 3"/>
+          <p:cNvSpPr txBox="1"/>
+          <p:nvPr/>
+        </p:nvSpPr>
+        <p:spPr>
+          <a:xfrm rot="16200000">
+            <a:off x="995761" y="4387327"/>
+            <a:ext cx="1310439" cy="369332"/>
+          </a:xfrm>
+          <a:prstGeom prst="rect">
+            <a:avLst/>
+          </a:prstGeom>
+          <a:noFill/>
+          <a:ln>
+            <a:solidFill>
+              <a:schemeClr val="accent1"/>
+            </a:solidFill>
+          </a:ln>
+        </p:spPr>
+        <p:txBody>
+          <a:bodyPr wrap="square" rtlCol="0">
+            <a:spAutoFit/>
+          </a:bodyPr>
+          <a:lstStyle/>
+          <a:p>
+            <a:pPr algn="ctr"/>
+            <a:r>
+              <a:rPr lang="en-US" dirty="0"/>
+              <a:t>Embedding</a:t>
+            </a:r>
+          </a:p>
+        </p:txBody>
+      </p:sp>
+      <p:sp>
+        <p:nvSpPr>
+          <p:cNvPr id="6" name="TextBox 5"/>
+          <p:cNvSpPr txBox="1"/>
+          <p:nvPr/>
+        </p:nvSpPr>
+        <p:spPr>
+          <a:xfrm rot="16200000">
+            <a:off x="4958235" y="2457934"/>
+            <a:ext cx="1310440" cy="369332"/>
+          </a:xfrm>
+          <a:prstGeom prst="rect">
+            <a:avLst/>
+          </a:prstGeom>
+          <a:noFill/>
+          <a:ln>
+            <a:solidFill>
+              <a:schemeClr val="accent2"/>
+            </a:solidFill>
+          </a:ln>
+        </p:spPr>
+        <p:txBody>
+          <a:bodyPr wrap="square" rtlCol="0">
+            <a:spAutoFit/>
+          </a:bodyPr>
+          <a:lstStyle/>
+          <a:p>
+            <a:pPr algn="ctr"/>
+            <a:r>
+              <a:rPr lang="en-US" dirty="0"/>
+              <a:t>LSTM</a:t>
+            </a:r>
+          </a:p>
+        </p:txBody>
+      </p:sp>
+      <p:sp>
+        <p:nvSpPr>
+          <p:cNvPr id="7" name="TextBox 6"/>
+          <p:cNvSpPr txBox="1"/>
+          <p:nvPr/>
+        </p:nvSpPr>
+        <p:spPr>
+          <a:xfrm rot="16200000">
+            <a:off x="-767127" y="4484910"/>
+            <a:ext cx="2565094" cy="369332"/>
+          </a:xfrm>
+          <a:prstGeom prst="rect">
+            <a:avLst/>
+          </a:prstGeom>
+          <a:noFill/>
+        </p:spPr>
+        <p:txBody>
+          <a:bodyPr wrap="square" rtlCol="0">
+            <a:spAutoFit/>
+          </a:bodyPr>
+          <a:lstStyle/>
+          <a:p>
+            <a:pPr algn="ctr"/>
+            <a:r>
+              <a:rPr lang="en-US" dirty="0"/>
+              <a:t>Lyrics n-gram sequence</a:t>
+            </a:r>
+          </a:p>
+        </p:txBody>
+      </p:sp>
+      <p:sp>
+        <p:nvSpPr>
+          <p:cNvPr id="8" name="TextBox 7"/>
+          <p:cNvSpPr txBox="1"/>
+          <p:nvPr/>
+        </p:nvSpPr>
+        <p:spPr>
+          <a:xfrm rot="16200000">
+            <a:off x="2620181" y="3494208"/>
+            <a:ext cx="2286000" cy="369332"/>
+          </a:xfrm>
+          <a:prstGeom prst="rect">
+            <a:avLst/>
+          </a:prstGeom>
+          <a:noFill/>
+          <a:ln>
+            <a:solidFill>
+              <a:schemeClr val="accent4"/>
+            </a:solidFill>
+          </a:ln>
+        </p:spPr>
+        <p:txBody>
+          <a:bodyPr wrap="square" rtlCol="0">
+            <a:spAutoFit/>
+          </a:bodyPr>
+          <a:lstStyle/>
+          <a:p>
+            <a:pPr algn="ctr"/>
+            <a:r>
+              <a:rPr lang="en-US" dirty="0"/>
+              <a:t>Batchnorm</a:t>
+            </a:r>
+          </a:p>
+        </p:txBody>
+      </p:sp>
+      <p:sp>
+        <p:nvSpPr>
+          <p:cNvPr id="9" name="Right Arrow 8"/>
+          <p:cNvSpPr/>
+          <p:nvPr/>
+        </p:nvSpPr>
+        <p:spPr>
+          <a:xfrm>
+            <a:off x="701037" y="4418910"/>
+            <a:ext cx="706582" cy="334880"/>
+          </a:xfrm>
+          <a:prstGeom prst="rightArrow">
+            <a:avLst/>
+          </a:prstGeom>
+        </p:spPr>
+        <p:style>
+          <a:lnRef idx="2">
+            <a:schemeClr val="accent1">
+              <a:shade val="50000"/>
+            </a:schemeClr>
+          </a:lnRef>
+          <a:fillRef idx="1">
+            <a:schemeClr val="accent1"/>
+          </a:fillRef>
+          <a:effectRef idx="0">
+            <a:schemeClr val="accent1"/>
+          </a:effectRef>
+          <a:fontRef idx="minor">
+            <a:schemeClr val="lt1"/>
+          </a:fontRef>
+        </p:style>
+        <p:txBody>
+          <a:bodyPr rtlCol="0" anchor="ctr"/>
+          <a:lstStyle/>
+          <a:p>
+            <a:pPr algn="ctr"/>
+            <a:endParaRPr lang="en-US"/>
+          </a:p>
+        </p:txBody>
+      </p:sp>
+      <p:cxnSp>
+        <p:nvCxnSpPr>
+          <p:cNvPr id="13" name="Straight Arrow Connector 12"/>
+          <p:cNvCxnSpPr>
+            <a:stCxn id="6" idx="1"/>
+            <a:endCxn id="15" idx="3"/>
+          </p:cNvCxnSpPr>
+          <p:nvPr/>
+        </p:nvCxnSpPr>
+        <p:spPr>
+          <a:xfrm>
+            <a:off x="5613455" y="3297820"/>
+            <a:ext cx="0" cy="209616"/>
+          </a:xfrm>
+          <a:prstGeom prst="straightConnector1">
+            <a:avLst/>
+          </a:prstGeom>
+          <a:ln>
+            <a:tailEnd type="triangle"/>
+          </a:ln>
+        </p:spPr>
+        <p:style>
+          <a:lnRef idx="1">
+            <a:schemeClr val="accent1"/>
+          </a:lnRef>
+          <a:fillRef idx="0">
+            <a:schemeClr val="accent1"/>
+          </a:fillRef>
+          <a:effectRef idx="0">
+            <a:schemeClr val="accent1"/>
+          </a:effectRef>
+          <a:fontRef idx="minor">
+            <a:schemeClr val="tx1"/>
+          </a:fontRef>
+        </p:style>
+      </p:cxnSp>
+      <p:sp>
+        <p:nvSpPr>
+          <p:cNvPr id="15" name="TextBox 14"/>
+          <p:cNvSpPr txBox="1"/>
+          <p:nvPr/>
+        </p:nvSpPr>
+        <p:spPr>
+          <a:xfrm rot="16200000">
+            <a:off x="5285845" y="3665769"/>
+            <a:ext cx="655220" cy="338554"/>
+          </a:xfrm>
+          <a:prstGeom prst="rect">
+            <a:avLst/>
+          </a:prstGeom>
+          <a:noFill/>
+          <a:ln>
+            <a:solidFill>
+              <a:schemeClr val="accent2"/>
+            </a:solidFill>
+          </a:ln>
+        </p:spPr>
+        <p:txBody>
+          <a:bodyPr wrap="square" rtlCol="0">
+            <a:spAutoFit/>
+          </a:bodyPr>
+          <a:lstStyle/>
+          <a:p>
+            <a:pPr algn="ctr"/>
+            <a:r>
+              <a:rPr lang="en-US" sz="1600" dirty="0"/>
+              <a:t>LSTM</a:t>
+            </a:r>
+          </a:p>
+        </p:txBody>
+      </p:sp>
+      <p:cxnSp>
+        <p:nvCxnSpPr>
+          <p:cNvPr id="16" name="Straight Arrow Connector 15"/>
+          <p:cNvCxnSpPr>
+            <a:cxnSpLocks/>
+            <a:endCxn id="15" idx="0"/>
+          </p:cNvCxnSpPr>
+          <p:nvPr/>
+        </p:nvCxnSpPr>
+        <p:spPr>
+          <a:xfrm>
+            <a:off x="5228962" y="3835046"/>
+            <a:ext cx="215216" cy="0"/>
+          </a:xfrm>
+          <a:prstGeom prst="straightConnector1">
+            <a:avLst/>
+          </a:prstGeom>
+          <a:ln>
+            <a:tailEnd type="triangle"/>
+          </a:ln>
+        </p:spPr>
+        <p:style>
+          <a:lnRef idx="1">
+            <a:schemeClr val="accent1"/>
+          </a:lnRef>
+          <a:fillRef idx="0">
+            <a:schemeClr val="accent1"/>
+          </a:fillRef>
+          <a:effectRef idx="0">
+            <a:schemeClr val="accent1"/>
+          </a:effectRef>
+          <a:fontRef idx="minor">
+            <a:schemeClr val="tx1"/>
+          </a:fontRef>
+        </p:style>
+      </p:cxnSp>
+      <p:cxnSp>
+        <p:nvCxnSpPr>
+          <p:cNvPr id="21" name="Straight Arrow Connector 20"/>
+          <p:cNvCxnSpPr>
+            <a:stCxn id="15" idx="1"/>
+          </p:cNvCxnSpPr>
+          <p:nvPr/>
+        </p:nvCxnSpPr>
+        <p:spPr>
+          <a:xfrm>
+            <a:off x="5613455" y="4162656"/>
+            <a:ext cx="1" cy="160898"/>
+          </a:xfrm>
+          <a:prstGeom prst="straightConnector1">
+            <a:avLst/>
+          </a:prstGeom>
+          <a:ln>
+            <a:tailEnd type="triangle"/>
+          </a:ln>
+        </p:spPr>
+        <p:style>
+          <a:lnRef idx="1">
+            <a:schemeClr val="accent1"/>
+          </a:lnRef>
+          <a:fillRef idx="0">
+            <a:schemeClr val="accent1"/>
+          </a:fillRef>
+          <a:effectRef idx="0">
+            <a:schemeClr val="accent1"/>
+          </a:effectRef>
+          <a:fontRef idx="minor">
+            <a:schemeClr val="tx1"/>
+          </a:fontRef>
+        </p:style>
+      </p:cxnSp>
+      <p:cxnSp>
+        <p:nvCxnSpPr>
+          <p:cNvPr id="23" name="Straight Arrow Connector 22"/>
+          <p:cNvCxnSpPr>
+            <a:stCxn id="6" idx="2"/>
+          </p:cNvCxnSpPr>
+          <p:nvPr/>
+        </p:nvCxnSpPr>
+        <p:spPr>
+          <a:xfrm>
+            <a:off x="5798121" y="2642600"/>
+            <a:ext cx="199827" cy="1"/>
+          </a:xfrm>
+          <a:prstGeom prst="straightConnector1">
+            <a:avLst/>
+          </a:prstGeom>
+          <a:ln>
+            <a:tailEnd type="triangle"/>
+          </a:ln>
+        </p:spPr>
+        <p:style>
+          <a:lnRef idx="1">
+            <a:schemeClr val="accent1"/>
+          </a:lnRef>
+          <a:fillRef idx="0">
+            <a:schemeClr val="accent1"/>
+          </a:fillRef>
+          <a:effectRef idx="0">
+            <a:schemeClr val="accent1"/>
+          </a:effectRef>
+          <a:fontRef idx="minor">
+            <a:schemeClr val="tx1"/>
+          </a:fontRef>
+        </p:style>
+      </p:cxnSp>
+      <p:cxnSp>
+        <p:nvCxnSpPr>
+          <p:cNvPr id="25" name="Straight Arrow Connector 24"/>
+          <p:cNvCxnSpPr>
+            <a:stCxn id="15" idx="2"/>
+          </p:cNvCxnSpPr>
+          <p:nvPr/>
+        </p:nvCxnSpPr>
+        <p:spPr>
+          <a:xfrm>
+            <a:off x="5782732" y="3835046"/>
+            <a:ext cx="215216" cy="1"/>
+          </a:xfrm>
+          <a:prstGeom prst="straightConnector1">
+            <a:avLst/>
+          </a:prstGeom>
+          <a:ln>
+            <a:tailEnd type="triangle"/>
+          </a:ln>
+        </p:spPr>
+        <p:style>
+          <a:lnRef idx="1">
+            <a:schemeClr val="accent1"/>
+          </a:lnRef>
+          <a:fillRef idx="0">
+            <a:schemeClr val="accent1"/>
+          </a:fillRef>
+          <a:effectRef idx="0">
+            <a:schemeClr val="accent1"/>
+          </a:effectRef>
+          <a:fontRef idx="minor">
+            <a:schemeClr val="tx1"/>
+          </a:fontRef>
+        </p:style>
+      </p:cxnSp>
+      <p:sp>
+        <p:nvSpPr>
+          <p:cNvPr id="26" name="TextBox 25"/>
+          <p:cNvSpPr txBox="1"/>
+          <p:nvPr/>
+        </p:nvSpPr>
+        <p:spPr>
+          <a:xfrm rot="5400000">
+            <a:off x="5457162" y="4343533"/>
+            <a:ext cx="343364" cy="369332"/>
+          </a:xfrm>
+          <a:prstGeom prst="rect">
+            <a:avLst/>
+          </a:prstGeom>
+          <a:noFill/>
+        </p:spPr>
+        <p:txBody>
+          <a:bodyPr wrap="none" rtlCol="0">
+            <a:spAutoFit/>
+          </a:bodyPr>
+          <a:lstStyle/>
+          <a:p>
+            <a:r>
+              <a:rPr lang="en-US" dirty="0"/>
+              <a:t>…</a:t>
+            </a:r>
+          </a:p>
+        </p:txBody>
+      </p:sp>
+      <p:cxnSp>
+        <p:nvCxnSpPr>
+          <p:cNvPr id="27" name="Straight Arrow Connector 26"/>
+          <p:cNvCxnSpPr>
+            <a:endCxn id="29" idx="3"/>
+          </p:cNvCxnSpPr>
+          <p:nvPr/>
+        </p:nvCxnSpPr>
+        <p:spPr>
+          <a:xfrm>
+            <a:off x="5609633" y="4608260"/>
+            <a:ext cx="0" cy="209616"/>
+          </a:xfrm>
+          <a:prstGeom prst="straightConnector1">
+            <a:avLst/>
+          </a:prstGeom>
+          <a:ln>
+            <a:tailEnd type="triangle"/>
+          </a:ln>
+        </p:spPr>
+        <p:style>
+          <a:lnRef idx="1">
+            <a:schemeClr val="accent1"/>
+          </a:lnRef>
+          <a:fillRef idx="0">
+            <a:schemeClr val="accent1"/>
+          </a:fillRef>
+          <a:effectRef idx="0">
+            <a:schemeClr val="accent1"/>
+          </a:effectRef>
+          <a:fontRef idx="minor">
+            <a:schemeClr val="tx1"/>
+          </a:fontRef>
+        </p:style>
+      </p:cxnSp>
+      <p:sp>
+        <p:nvSpPr>
+          <p:cNvPr id="28" name="TextBox 27"/>
+          <p:cNvSpPr txBox="1"/>
+          <p:nvPr/>
+        </p:nvSpPr>
+        <p:spPr>
+          <a:xfrm rot="16200000">
+            <a:off x="4564288" y="4960821"/>
+            <a:ext cx="655218" cy="369332"/>
+          </a:xfrm>
+          <a:prstGeom prst="rect">
+            <a:avLst/>
+          </a:prstGeom>
+          <a:noFill/>
+          <a:ln>
+            <a:solidFill>
+              <a:schemeClr val="accent1"/>
+            </a:solidFill>
+          </a:ln>
+        </p:spPr>
+        <p:txBody>
+          <a:bodyPr wrap="square" rtlCol="0">
+            <a:spAutoFit/>
+          </a:bodyPr>
+          <a:lstStyle/>
+          <a:p>
+            <a:pPr algn="ctr"/>
+            <a:r>
+              <a:rPr lang="en-US" dirty="0"/>
+              <a:t>Emb.</a:t>
+            </a:r>
+          </a:p>
+        </p:txBody>
+      </p:sp>
+      <p:sp>
+        <p:nvSpPr>
+          <p:cNvPr id="29" name="TextBox 28"/>
+          <p:cNvSpPr txBox="1"/>
+          <p:nvPr/>
+        </p:nvSpPr>
+        <p:spPr>
+          <a:xfrm rot="16200000">
+            <a:off x="5282023" y="4976209"/>
+            <a:ext cx="655220" cy="338554"/>
+          </a:xfrm>
+          <a:prstGeom prst="rect">
+            <a:avLst/>
+          </a:prstGeom>
+          <a:noFill/>
+          <a:ln>
+            <a:solidFill>
+              <a:schemeClr val="accent2"/>
+            </a:solidFill>
+          </a:ln>
+        </p:spPr>
+        <p:txBody>
+          <a:bodyPr wrap="square" rtlCol="0">
+            <a:spAutoFit/>
+          </a:bodyPr>
+          <a:lstStyle/>
+          <a:p>
+            <a:pPr algn="ctr"/>
+            <a:r>
+              <a:rPr lang="en-US" sz="1600" dirty="0"/>
+              <a:t>LSTM</a:t>
+            </a:r>
+          </a:p>
+        </p:txBody>
+      </p:sp>
+      <p:sp>
+        <p:nvSpPr>
+          <p:cNvPr id="34" name="TextBox 33"/>
+          <p:cNvSpPr txBox="1"/>
+          <p:nvPr/>
+        </p:nvSpPr>
+        <p:spPr>
+          <a:xfrm rot="16200000">
+            <a:off x="6790941" y="3548389"/>
+            <a:ext cx="2286000" cy="369332"/>
+          </a:xfrm>
+          <a:prstGeom prst="rect">
+            <a:avLst/>
+          </a:prstGeom>
+          <a:noFill/>
+          <a:ln>
+            <a:solidFill>
+              <a:schemeClr val="accent6"/>
+            </a:solidFill>
+          </a:ln>
+        </p:spPr>
+        <p:txBody>
+          <a:bodyPr wrap="square" rtlCol="0">
+            <a:spAutoFit/>
+          </a:bodyPr>
+          <a:lstStyle/>
+          <a:p>
+            <a:pPr algn="ctr"/>
+            <a:r>
+              <a:rPr lang="en-US" dirty="0"/>
+              <a:t>Dense</a:t>
+            </a:r>
+          </a:p>
+        </p:txBody>
+      </p:sp>
+      <p:sp>
+        <p:nvSpPr>
+          <p:cNvPr id="35" name="TextBox 34"/>
+          <p:cNvSpPr txBox="1"/>
+          <p:nvPr/>
+        </p:nvSpPr>
+        <p:spPr>
+          <a:xfrm rot="16200000">
+            <a:off x="6169404" y="3494206"/>
+            <a:ext cx="1565325" cy="369332"/>
+          </a:xfrm>
+          <a:prstGeom prst="rect">
+            <a:avLst/>
+          </a:prstGeom>
+          <a:ln/>
+        </p:spPr>
+        <p:style>
+          <a:lnRef idx="2">
+            <a:schemeClr val="accent3"/>
+          </a:lnRef>
+          <a:fillRef idx="1">
+            <a:schemeClr val="lt1"/>
+          </a:fillRef>
+          <a:effectRef idx="0">
+            <a:schemeClr val="accent3"/>
+          </a:effectRef>
+          <a:fontRef idx="minor">
+            <a:schemeClr val="dk1"/>
+          </a:fontRef>
+        </p:style>
+        <p:txBody>
+          <a:bodyPr wrap="square" rtlCol="0">
+            <a:spAutoFit/>
+          </a:bodyPr>
+          <a:lstStyle/>
+          <a:p>
+            <a:pPr algn="ctr"/>
+            <a:r>
+              <a:rPr lang="en-US" dirty="0"/>
+              <a:t>Dropout (0.5)</a:t>
+            </a:r>
+          </a:p>
+        </p:txBody>
+      </p:sp>
+      <p:sp>
+        <p:nvSpPr>
+          <p:cNvPr id="36" name="TextBox 35"/>
+          <p:cNvSpPr txBox="1"/>
+          <p:nvPr/>
+        </p:nvSpPr>
+        <p:spPr>
+          <a:xfrm rot="16200000">
+            <a:off x="-627580" y="1992430"/>
+            <a:ext cx="2286001" cy="369332"/>
+          </a:xfrm>
+          <a:prstGeom prst="rect">
+            <a:avLst/>
+          </a:prstGeom>
+          <a:noFill/>
+        </p:spPr>
+        <p:txBody>
+          <a:bodyPr wrap="square" rtlCol="0">
+            <a:spAutoFit/>
+          </a:bodyPr>
+          <a:lstStyle/>
+          <a:p>
+            <a:pPr algn="ctr"/>
+            <a:r>
+              <a:rPr lang="en-US" dirty="0"/>
+              <a:t>MIDI meta-data</a:t>
+            </a:r>
+          </a:p>
+        </p:txBody>
+      </p:sp>
+      <p:sp>
+        <p:nvSpPr>
+          <p:cNvPr id="37" name="Right Arrow 36"/>
+          <p:cNvSpPr/>
+          <p:nvPr/>
+        </p:nvSpPr>
+        <p:spPr>
+          <a:xfrm>
+            <a:off x="3157410" y="3511433"/>
+            <a:ext cx="409183" cy="334880"/>
+          </a:xfrm>
+          <a:prstGeom prst="rightArrow">
+            <a:avLst/>
+          </a:prstGeom>
+        </p:spPr>
+        <p:style>
+          <a:lnRef idx="2">
+            <a:schemeClr val="accent1">
+              <a:shade val="50000"/>
+            </a:schemeClr>
+          </a:lnRef>
+          <a:fillRef idx="1">
+            <a:schemeClr val="accent1"/>
+          </a:fillRef>
+          <a:effectRef idx="0">
+            <a:schemeClr val="accent1"/>
+          </a:effectRef>
+          <a:fontRef idx="minor">
+            <a:schemeClr val="lt1"/>
+          </a:fontRef>
+        </p:style>
+        <p:txBody>
+          <a:bodyPr rtlCol="0" anchor="ctr"/>
+          <a:lstStyle/>
+          <a:p>
+            <a:pPr algn="ctr"/>
+            <a:endParaRPr lang="en-US"/>
+          </a:p>
+        </p:txBody>
+      </p:sp>
+      <p:sp>
+        <p:nvSpPr>
+          <p:cNvPr id="47" name="Right Arrow 46"/>
+          <p:cNvSpPr/>
+          <p:nvPr/>
+        </p:nvSpPr>
+        <p:spPr>
+          <a:xfrm rot="2380134">
+            <a:off x="600911" y="2510361"/>
+            <a:ext cx="2348963" cy="334880"/>
+          </a:xfrm>
+          <a:prstGeom prst="rightArrow">
+            <a:avLst/>
+          </a:prstGeom>
+        </p:spPr>
+        <p:style>
+          <a:lnRef idx="2">
+            <a:schemeClr val="accent1">
+              <a:shade val="50000"/>
+            </a:schemeClr>
+          </a:lnRef>
+          <a:fillRef idx="1">
+            <a:schemeClr val="accent1"/>
+          </a:fillRef>
+          <a:effectRef idx="0">
+            <a:schemeClr val="accent1"/>
+          </a:effectRef>
+          <a:fontRef idx="minor">
+            <a:schemeClr val="lt1"/>
+          </a:fontRef>
+        </p:style>
+        <p:txBody>
+          <a:bodyPr rtlCol="0" anchor="ctr"/>
+          <a:lstStyle/>
+          <a:p>
+            <a:pPr algn="ctr"/>
+            <a:endParaRPr lang="en-US"/>
+          </a:p>
+        </p:txBody>
+      </p:sp>
+      <p:sp>
+        <p:nvSpPr>
+          <p:cNvPr id="48" name="Right Arrow 47"/>
+          <p:cNvSpPr/>
+          <p:nvPr/>
+        </p:nvSpPr>
+        <p:spPr>
+          <a:xfrm rot="19195509">
+            <a:off x="1856750" y="4014030"/>
+            <a:ext cx="928894" cy="334880"/>
+          </a:xfrm>
+          <a:prstGeom prst="rightArrow">
+            <a:avLst/>
+          </a:prstGeom>
+        </p:spPr>
+        <p:style>
+          <a:lnRef idx="2">
+            <a:schemeClr val="accent1">
+              <a:shade val="50000"/>
+            </a:schemeClr>
+          </a:lnRef>
+          <a:fillRef idx="1">
+            <a:schemeClr val="accent1"/>
+          </a:fillRef>
+          <a:effectRef idx="0">
+            <a:schemeClr val="accent1"/>
+          </a:effectRef>
+          <a:fontRef idx="minor">
+            <a:schemeClr val="lt1"/>
+          </a:fontRef>
+        </p:style>
+        <p:txBody>
+          <a:bodyPr rtlCol="0" anchor="ctr"/>
+          <a:lstStyle/>
+          <a:p>
+            <a:pPr algn="ctr"/>
+            <a:endParaRPr lang="en-US"/>
+          </a:p>
+        </p:txBody>
+      </p:sp>
+      <p:sp>
+        <p:nvSpPr>
+          <p:cNvPr id="49" name="TextBox 48"/>
+          <p:cNvSpPr txBox="1"/>
+          <p:nvPr/>
+        </p:nvSpPr>
+        <p:spPr>
+          <a:xfrm rot="16200000">
+            <a:off x="1811493" y="3494208"/>
+            <a:ext cx="2286000" cy="369332"/>
+          </a:xfrm>
+          <a:prstGeom prst="rect">
+            <a:avLst/>
+          </a:prstGeom>
+          <a:ln/>
+        </p:spPr>
+        <p:style>
+          <a:lnRef idx="2">
+            <a:schemeClr val="accent2"/>
+          </a:lnRef>
+          <a:fillRef idx="1">
+            <a:schemeClr val="lt1"/>
+          </a:fillRef>
+          <a:effectRef idx="0">
+            <a:schemeClr val="accent2"/>
+          </a:effectRef>
+          <a:fontRef idx="minor">
+            <a:schemeClr val="dk1"/>
+          </a:fontRef>
+        </p:style>
+        <p:txBody>
+          <a:bodyPr wrap="square" rtlCol="0">
+            <a:spAutoFit/>
+          </a:bodyPr>
+          <a:lstStyle/>
+          <a:p>
+            <a:pPr algn="ctr"/>
+            <a:r>
+              <a:rPr lang="en-US" dirty="0"/>
+              <a:t>Concatenate layer</a:t>
+            </a:r>
+          </a:p>
+        </p:txBody>
+      </p:sp>
+      <p:sp>
+        <p:nvSpPr>
+          <p:cNvPr id="53" name="TextBox 52"/>
+          <p:cNvSpPr txBox="1"/>
+          <p:nvPr/>
+        </p:nvSpPr>
+        <p:spPr>
+          <a:xfrm rot="16200000">
+            <a:off x="7528275" y="3569672"/>
+            <a:ext cx="2565094" cy="369332"/>
+          </a:xfrm>
+          <a:prstGeom prst="rect">
+            <a:avLst/>
+          </a:prstGeom>
+          <a:noFill/>
+        </p:spPr>
+        <p:txBody>
+          <a:bodyPr wrap="square" rtlCol="0">
+            <a:spAutoFit/>
+          </a:bodyPr>
+          <a:lstStyle/>
+          <a:p>
+            <a:pPr algn="ctr"/>
+            <a:r>
+              <a:rPr lang="en-US" dirty="0"/>
+              <a:t>OUTPUT</a:t>
+            </a:r>
+          </a:p>
+        </p:txBody>
+      </p:sp>
+      <p:sp>
+        <p:nvSpPr>
+          <p:cNvPr id="54" name="Right Arrow 53"/>
+          <p:cNvSpPr/>
+          <p:nvPr/>
+        </p:nvSpPr>
+        <p:spPr>
+          <a:xfrm>
+            <a:off x="3985188" y="3511433"/>
+            <a:ext cx="482655" cy="334880"/>
+          </a:xfrm>
+          <a:prstGeom prst="rightArrow">
+            <a:avLst/>
+          </a:prstGeom>
+        </p:spPr>
+        <p:style>
+          <a:lnRef idx="2">
+            <a:schemeClr val="accent1">
+              <a:shade val="50000"/>
+            </a:schemeClr>
+          </a:lnRef>
+          <a:fillRef idx="1">
+            <a:schemeClr val="accent1"/>
+          </a:fillRef>
+          <a:effectRef idx="0">
+            <a:schemeClr val="accent1"/>
+          </a:effectRef>
+          <a:fontRef idx="minor">
+            <a:schemeClr val="lt1"/>
+          </a:fontRef>
+        </p:style>
+        <p:txBody>
+          <a:bodyPr rtlCol="0" anchor="ctr"/>
+          <a:lstStyle/>
+          <a:p>
+            <a:pPr algn="ctr"/>
+            <a:endParaRPr lang="en-US"/>
+          </a:p>
+        </p:txBody>
+      </p:sp>
+      <p:sp>
+        <p:nvSpPr>
+          <p:cNvPr id="44" name="TextBox 43">
+            <a:extLst>
+              <a:ext uri="{FF2B5EF4-FFF2-40B4-BE49-F238E27FC236}">
+                <a16:creationId xmlns:a16="http://schemas.microsoft.com/office/drawing/2014/main" id="{44E657A8-B12A-4098-8798-F3E123D4567C}"/>
+              </a:ext>
+            </a:extLst>
+          </p:cNvPr>
+          <p:cNvSpPr txBox="1"/>
+          <p:nvPr/>
+        </p:nvSpPr>
+        <p:spPr>
+          <a:xfrm rot="16200000">
+            <a:off x="4236674" y="2319436"/>
+            <a:ext cx="1310439" cy="646331"/>
+          </a:xfrm>
+          <a:prstGeom prst="rect">
+            <a:avLst/>
+          </a:prstGeom>
+          <a:noFill/>
+          <a:ln>
+            <a:solidFill>
+              <a:schemeClr val="accent1"/>
+            </a:solidFill>
+          </a:ln>
+        </p:spPr>
+        <p:txBody>
+          <a:bodyPr wrap="square" rtlCol="0">
+            <a:spAutoFit/>
+          </a:bodyPr>
+          <a:lstStyle/>
+          <a:p>
+            <a:pPr algn="ctr"/>
+            <a:r>
+              <a:rPr lang="en-US" dirty="0"/>
+              <a:t>Midi + word embedding</a:t>
+            </a:r>
+          </a:p>
+        </p:txBody>
+      </p:sp>
+      <p:cxnSp>
+        <p:nvCxnSpPr>
+          <p:cNvPr id="50" name="Straight Arrow Connector 49">
+            <a:extLst>
+              <a:ext uri="{FF2B5EF4-FFF2-40B4-BE49-F238E27FC236}">
+                <a16:creationId xmlns:a16="http://schemas.microsoft.com/office/drawing/2014/main" id="{4EBDE88E-D505-4D5B-AC22-3048DDE86F76}"/>
+              </a:ext>
+            </a:extLst>
+          </p:cNvPr>
+          <p:cNvCxnSpPr>
+            <a:cxnSpLocks/>
+          </p:cNvCxnSpPr>
+          <p:nvPr/>
+        </p:nvCxnSpPr>
+        <p:spPr>
+          <a:xfrm>
+            <a:off x="5228962" y="2652436"/>
+            <a:ext cx="205608" cy="1"/>
+          </a:xfrm>
+          <a:prstGeom prst="straightConnector1">
+            <a:avLst/>
+          </a:prstGeom>
+          <a:ln>
+            <a:tailEnd type="triangle"/>
+          </a:ln>
+        </p:spPr>
+        <p:style>
+          <a:lnRef idx="1">
+            <a:schemeClr val="accent1"/>
+          </a:lnRef>
+          <a:fillRef idx="0">
+            <a:schemeClr val="accent1"/>
+          </a:fillRef>
+          <a:effectRef idx="0">
+            <a:schemeClr val="accent1"/>
+          </a:effectRef>
+          <a:fontRef idx="minor">
+            <a:schemeClr val="tx1"/>
+          </a:fontRef>
+        </p:style>
+      </p:cxnSp>
+      <p:sp>
+        <p:nvSpPr>
+          <p:cNvPr id="52" name="Right Arrow 53">
+            <a:extLst>
+              <a:ext uri="{FF2B5EF4-FFF2-40B4-BE49-F238E27FC236}">
+                <a16:creationId xmlns:a16="http://schemas.microsoft.com/office/drawing/2014/main" id="{4CAEB809-2DDE-4E44-AF1A-15E1282A20EA}"/>
+              </a:ext>
+            </a:extLst>
+          </p:cNvPr>
+          <p:cNvSpPr/>
+          <p:nvPr/>
+        </p:nvSpPr>
+        <p:spPr>
+          <a:xfrm>
+            <a:off x="6158668" y="3565615"/>
+            <a:ext cx="584430" cy="334880"/>
+          </a:xfrm>
+          <a:prstGeom prst="rightArrow">
+            <a:avLst/>
+          </a:prstGeom>
+        </p:spPr>
+        <p:style>
+          <a:lnRef idx="2">
+            <a:schemeClr val="accent1">
+              <a:shade val="50000"/>
+            </a:schemeClr>
+          </a:lnRef>
+          <a:fillRef idx="1">
+            <a:schemeClr val="accent1"/>
+          </a:fillRef>
+          <a:effectRef idx="0">
+            <a:schemeClr val="accent1"/>
+          </a:effectRef>
+          <a:fontRef idx="minor">
+            <a:schemeClr val="lt1"/>
+          </a:fontRef>
+        </p:style>
+        <p:txBody>
+          <a:bodyPr rtlCol="0" anchor="ctr"/>
+          <a:lstStyle/>
+          <a:p>
+            <a:pPr algn="ctr"/>
+            <a:endParaRPr lang="en-US"/>
+          </a:p>
+        </p:txBody>
+      </p:sp>
+      <p:sp>
+        <p:nvSpPr>
+          <p:cNvPr id="56" name="Right Arrow 53">
+            <a:extLst>
+              <a:ext uri="{FF2B5EF4-FFF2-40B4-BE49-F238E27FC236}">
+                <a16:creationId xmlns:a16="http://schemas.microsoft.com/office/drawing/2014/main" id="{F1DE7831-FA46-4A0C-8692-7BBDD8DA465B}"/>
+              </a:ext>
+            </a:extLst>
+          </p:cNvPr>
+          <p:cNvSpPr/>
+          <p:nvPr/>
+        </p:nvSpPr>
+        <p:spPr>
+          <a:xfrm>
+            <a:off x="7164845" y="3586898"/>
+            <a:ext cx="584430" cy="334880"/>
+          </a:xfrm>
+          <a:prstGeom prst="rightArrow">
+            <a:avLst/>
+          </a:prstGeom>
+        </p:spPr>
+        <p:style>
+          <a:lnRef idx="2">
+            <a:schemeClr val="accent1">
+              <a:shade val="50000"/>
+            </a:schemeClr>
+          </a:lnRef>
+          <a:fillRef idx="1">
+            <a:schemeClr val="accent1"/>
+          </a:fillRef>
+          <a:effectRef idx="0">
+            <a:schemeClr val="accent1"/>
+          </a:effectRef>
+          <a:fontRef idx="minor">
+            <a:schemeClr val="lt1"/>
+          </a:fontRef>
+        </p:style>
+        <p:txBody>
+          <a:bodyPr rtlCol="0" anchor="ctr"/>
+          <a:lstStyle/>
+          <a:p>
+            <a:pPr algn="ctr"/>
+            <a:endParaRPr lang="en-US"/>
+          </a:p>
+        </p:txBody>
+      </p:sp>
+      <p:sp>
+        <p:nvSpPr>
+          <p:cNvPr id="57" name="Right Arrow 53">
+            <a:extLst>
+              <a:ext uri="{FF2B5EF4-FFF2-40B4-BE49-F238E27FC236}">
+                <a16:creationId xmlns:a16="http://schemas.microsoft.com/office/drawing/2014/main" id="{41A32938-3CA1-467B-BA4F-8325D23706F7}"/>
+              </a:ext>
+            </a:extLst>
+          </p:cNvPr>
+          <p:cNvSpPr/>
+          <p:nvPr/>
+        </p:nvSpPr>
+        <p:spPr>
+          <a:xfrm>
+            <a:off x="8142317" y="3565615"/>
+            <a:ext cx="545225" cy="334880"/>
+          </a:xfrm>
+          <a:prstGeom prst="rightArrow">
+            <a:avLst/>
+          </a:prstGeom>
+        </p:spPr>
+        <p:style>
+          <a:lnRef idx="2">
+            <a:schemeClr val="accent1">
+              <a:shade val="50000"/>
+            </a:schemeClr>
+          </a:lnRef>
+          <a:fillRef idx="1">
+            <a:schemeClr val="accent1"/>
+          </a:fillRef>
+          <a:effectRef idx="0">
+            <a:schemeClr val="accent1"/>
+          </a:effectRef>
+          <a:fontRef idx="minor">
+            <a:schemeClr val="lt1"/>
+          </a:fontRef>
+        </p:style>
+        <p:txBody>
+          <a:bodyPr rtlCol="0" anchor="ctr"/>
+          <a:lstStyle/>
+          <a:p>
+            <a:pPr algn="ctr"/>
+            <a:endParaRPr lang="en-US"/>
+          </a:p>
+        </p:txBody>
+      </p:sp>
+      <p:sp>
+        <p:nvSpPr>
+          <p:cNvPr id="58" name="TextBox 57">
+            <a:extLst>
+              <a:ext uri="{FF2B5EF4-FFF2-40B4-BE49-F238E27FC236}">
+                <a16:creationId xmlns:a16="http://schemas.microsoft.com/office/drawing/2014/main" id="{CCA63ADA-72B1-4464-B132-4E049EE66844}"/>
+              </a:ext>
+            </a:extLst>
+          </p:cNvPr>
+          <p:cNvSpPr txBox="1"/>
+          <p:nvPr/>
+        </p:nvSpPr>
+        <p:spPr>
+          <a:xfrm rot="16200000">
+            <a:off x="4218890" y="3691191"/>
+            <a:ext cx="1310439" cy="646331"/>
+          </a:xfrm>
+          <a:prstGeom prst="rect">
+            <a:avLst/>
+          </a:prstGeom>
+          <a:noFill/>
+          <a:ln>
+            <a:solidFill>
+              <a:schemeClr val="accent1"/>
+            </a:solidFill>
+          </a:ln>
+        </p:spPr>
+        <p:txBody>
+          <a:bodyPr wrap="square" rtlCol="0">
+            <a:spAutoFit/>
+          </a:bodyPr>
+          <a:lstStyle/>
+          <a:p>
+            <a:pPr algn="ctr"/>
+            <a:r>
+              <a:rPr lang="en-US" dirty="0"/>
+              <a:t>Midi + word embedding</a:t>
+            </a:r>
+          </a:p>
+        </p:txBody>
+      </p:sp>
+    </p:spTree>
+    <p:extLst>
+      <p:ext uri="{BB962C8B-B14F-4D97-AF65-F5344CB8AC3E}">
+        <p14:creationId xmlns:p14="http://schemas.microsoft.com/office/powerpoint/2010/main" val="1396536609"/>
       </p:ext>
     </p:extLst>
   </p:cSld>

</xml_diff>